<commit_message>
3.18: Complete Advanced Algebra
</commit_message>
<xml_diff>
--- a/English/Presentation/pre.pptx
+++ b/English/Presentation/pre.pptx
@@ -1,9 +1,12 @@
 
 <file path=ppt/presentation.xml><?xml version="1.0" encoding="utf-8"?>
-<p:presentation xmlns:a="http://schemas.openxmlformats.org/drawingml/2006/main" xmlns:r="http://schemas.openxmlformats.org/officeDocument/2006/relationships" xmlns:p="http://schemas.openxmlformats.org/presentationml/2006/main" saveSubsetFonts="1">
+<p:presentation xmlns:a="http://schemas.openxmlformats.org/drawingml/2006/main" xmlns:r="http://schemas.openxmlformats.org/officeDocument/2006/relationships" xmlns:p="http://schemas.openxmlformats.org/presentationml/2006/main">
   <p:sldMasterIdLst>
     <p:sldMasterId id="2147483648" r:id="rId1"/>
   </p:sldMasterIdLst>
+  <p:sldIdLst>
+    <p:sldId id="256" r:id="rId3"/>
+  </p:sldIdLst>
   <p:sldSz cx="12192000" cy="6858000"/>
   <p:notesSz cx="6858000" cy="9144000"/>
   <p:defaultTextStyle>
@@ -235,7 +238,6 @@
           <a:p>
             <a:fld id="{D997B5FA-0921-464F-AAE1-844C04324D75}" type="datetimeFigureOut">
               <a:rPr lang="zh-CN" altLang="en-US" smtClean="0"/>
-              <a:t>2015/5/5</a:t>
             </a:fld>
             <a:endParaRPr lang="zh-CN" altLang="en-US"/>
           </a:p>
@@ -277,18 +279,12 @@
           <a:p>
             <a:fld id="{565CE74E-AB26-4998-AD42-012C4C1AD076}" type="slidenum">
               <a:rPr lang="zh-CN" altLang="en-US" smtClean="0"/>
-              <a:t>‹#›</a:t>
             </a:fld>
             <a:endParaRPr lang="zh-CN" altLang="en-US"/>
           </a:p>
         </p:txBody>
       </p:sp>
     </p:spTree>
-    <p:extLst>
-      <p:ext uri="{BB962C8B-B14F-4D97-AF65-F5344CB8AC3E}">
-        <p14:creationId xmlns:p14="http://schemas.microsoft.com/office/powerpoint/2010/main" val="3051827620"/>
-      </p:ext>
-    </p:extLst>
   </p:cSld>
   <p:clrMapOvr>
     <a:masterClrMapping/>
@@ -356,6 +352,7 @@
               <a:rPr lang="zh-CN" altLang="en-US" smtClean="0"/>
               <a:t>单击此处编辑母版文本样式</a:t>
             </a:r>
+            <a:endParaRPr lang="zh-CN" altLang="en-US" smtClean="0"/>
           </a:p>
           <a:p>
             <a:pPr lvl="1"/>
@@ -363,6 +360,7 @@
               <a:rPr lang="zh-CN" altLang="en-US" smtClean="0"/>
               <a:t>第二级</a:t>
             </a:r>
+            <a:endParaRPr lang="zh-CN" altLang="en-US" smtClean="0"/>
           </a:p>
           <a:p>
             <a:pPr lvl="2"/>
@@ -370,6 +368,7 @@
               <a:rPr lang="zh-CN" altLang="en-US" smtClean="0"/>
               <a:t>第三级</a:t>
             </a:r>
+            <a:endParaRPr lang="zh-CN" altLang="en-US" smtClean="0"/>
           </a:p>
           <a:p>
             <a:pPr lvl="3"/>
@@ -377,6 +376,7 @@
               <a:rPr lang="zh-CN" altLang="en-US" smtClean="0"/>
               <a:t>第四级</a:t>
             </a:r>
+            <a:endParaRPr lang="zh-CN" altLang="en-US" smtClean="0"/>
           </a:p>
           <a:p>
             <a:pPr lvl="4"/>
@@ -405,7 +405,6 @@
           <a:p>
             <a:fld id="{D997B5FA-0921-464F-AAE1-844C04324D75}" type="datetimeFigureOut">
               <a:rPr lang="zh-CN" altLang="en-US" smtClean="0"/>
-              <a:t>2015/5/5</a:t>
             </a:fld>
             <a:endParaRPr lang="zh-CN" altLang="en-US"/>
           </a:p>
@@ -447,18 +446,12 @@
           <a:p>
             <a:fld id="{565CE74E-AB26-4998-AD42-012C4C1AD076}" type="slidenum">
               <a:rPr lang="zh-CN" altLang="en-US" smtClean="0"/>
-              <a:t>‹#›</a:t>
             </a:fld>
             <a:endParaRPr lang="zh-CN" altLang="en-US"/>
           </a:p>
         </p:txBody>
       </p:sp>
     </p:spTree>
-    <p:extLst>
-      <p:ext uri="{BB962C8B-B14F-4D97-AF65-F5344CB8AC3E}">
-        <p14:creationId xmlns:p14="http://schemas.microsoft.com/office/powerpoint/2010/main" val="3188717747"/>
-      </p:ext>
-    </p:extLst>
   </p:cSld>
   <p:clrMapOvr>
     <a:masterClrMapping/>
@@ -536,6 +529,7 @@
               <a:rPr lang="zh-CN" altLang="en-US" smtClean="0"/>
               <a:t>单击此处编辑母版文本样式</a:t>
             </a:r>
+            <a:endParaRPr lang="zh-CN" altLang="en-US" smtClean="0"/>
           </a:p>
           <a:p>
             <a:pPr lvl="1"/>
@@ -543,6 +537,7 @@
               <a:rPr lang="zh-CN" altLang="en-US" smtClean="0"/>
               <a:t>第二级</a:t>
             </a:r>
+            <a:endParaRPr lang="zh-CN" altLang="en-US" smtClean="0"/>
           </a:p>
           <a:p>
             <a:pPr lvl="2"/>
@@ -550,6 +545,7 @@
               <a:rPr lang="zh-CN" altLang="en-US" smtClean="0"/>
               <a:t>第三级</a:t>
             </a:r>
+            <a:endParaRPr lang="zh-CN" altLang="en-US" smtClean="0"/>
           </a:p>
           <a:p>
             <a:pPr lvl="3"/>
@@ -557,6 +553,7 @@
               <a:rPr lang="zh-CN" altLang="en-US" smtClean="0"/>
               <a:t>第四级</a:t>
             </a:r>
+            <a:endParaRPr lang="zh-CN" altLang="en-US" smtClean="0"/>
           </a:p>
           <a:p>
             <a:pPr lvl="4"/>
@@ -585,7 +582,6 @@
           <a:p>
             <a:fld id="{D997B5FA-0921-464F-AAE1-844C04324D75}" type="datetimeFigureOut">
               <a:rPr lang="zh-CN" altLang="en-US" smtClean="0"/>
-              <a:t>2015/5/5</a:t>
             </a:fld>
             <a:endParaRPr lang="zh-CN" altLang="en-US"/>
           </a:p>
@@ -627,18 +623,12 @@
           <a:p>
             <a:fld id="{565CE74E-AB26-4998-AD42-012C4C1AD076}" type="slidenum">
               <a:rPr lang="zh-CN" altLang="en-US" smtClean="0"/>
-              <a:t>‹#›</a:t>
             </a:fld>
             <a:endParaRPr lang="zh-CN" altLang="en-US"/>
           </a:p>
         </p:txBody>
       </p:sp>
     </p:spTree>
-    <p:extLst>
-      <p:ext uri="{BB962C8B-B14F-4D97-AF65-F5344CB8AC3E}">
-        <p14:creationId xmlns:p14="http://schemas.microsoft.com/office/powerpoint/2010/main" val="4025501431"/>
-      </p:ext>
-    </p:extLst>
   </p:cSld>
   <p:clrMapOvr>
     <a:masterClrMapping/>
@@ -706,6 +696,7 @@
               <a:rPr lang="zh-CN" altLang="en-US" smtClean="0"/>
               <a:t>单击此处编辑母版文本样式</a:t>
             </a:r>
+            <a:endParaRPr lang="zh-CN" altLang="en-US" smtClean="0"/>
           </a:p>
           <a:p>
             <a:pPr lvl="1"/>
@@ -713,6 +704,7 @@
               <a:rPr lang="zh-CN" altLang="en-US" smtClean="0"/>
               <a:t>第二级</a:t>
             </a:r>
+            <a:endParaRPr lang="zh-CN" altLang="en-US" smtClean="0"/>
           </a:p>
           <a:p>
             <a:pPr lvl="2"/>
@@ -720,6 +712,7 @@
               <a:rPr lang="zh-CN" altLang="en-US" smtClean="0"/>
               <a:t>第三级</a:t>
             </a:r>
+            <a:endParaRPr lang="zh-CN" altLang="en-US" smtClean="0"/>
           </a:p>
           <a:p>
             <a:pPr lvl="3"/>
@@ -727,6 +720,7 @@
               <a:rPr lang="zh-CN" altLang="en-US" smtClean="0"/>
               <a:t>第四级</a:t>
             </a:r>
+            <a:endParaRPr lang="zh-CN" altLang="en-US" smtClean="0"/>
           </a:p>
           <a:p>
             <a:pPr lvl="4"/>
@@ -755,7 +749,6 @@
           <a:p>
             <a:fld id="{D997B5FA-0921-464F-AAE1-844C04324D75}" type="datetimeFigureOut">
               <a:rPr lang="zh-CN" altLang="en-US" smtClean="0"/>
-              <a:t>2015/5/5</a:t>
             </a:fld>
             <a:endParaRPr lang="zh-CN" altLang="en-US"/>
           </a:p>
@@ -797,18 +790,12 @@
           <a:p>
             <a:fld id="{565CE74E-AB26-4998-AD42-012C4C1AD076}" type="slidenum">
               <a:rPr lang="zh-CN" altLang="en-US" smtClean="0"/>
-              <a:t>‹#›</a:t>
             </a:fld>
             <a:endParaRPr lang="zh-CN" altLang="en-US"/>
           </a:p>
         </p:txBody>
       </p:sp>
     </p:spTree>
-    <p:extLst>
-      <p:ext uri="{BB962C8B-B14F-4D97-AF65-F5344CB8AC3E}">
-        <p14:creationId xmlns:p14="http://schemas.microsoft.com/office/powerpoint/2010/main" val="598653943"/>
-      </p:ext>
-    </p:extLst>
   </p:cSld>
   <p:clrMapOvr>
     <a:masterClrMapping/>
@@ -981,6 +968,7 @@
               <a:rPr lang="zh-CN" altLang="en-US" smtClean="0"/>
               <a:t>单击此处编辑母版文本样式</a:t>
             </a:r>
+            <a:endParaRPr lang="zh-CN" altLang="en-US" smtClean="0"/>
           </a:p>
         </p:txBody>
       </p:sp>
@@ -1001,7 +989,6 @@
           <a:p>
             <a:fld id="{D997B5FA-0921-464F-AAE1-844C04324D75}" type="datetimeFigureOut">
               <a:rPr lang="zh-CN" altLang="en-US" smtClean="0"/>
-              <a:t>2015/5/5</a:t>
             </a:fld>
             <a:endParaRPr lang="zh-CN" altLang="en-US"/>
           </a:p>
@@ -1043,18 +1030,12 @@
           <a:p>
             <a:fld id="{565CE74E-AB26-4998-AD42-012C4C1AD076}" type="slidenum">
               <a:rPr lang="zh-CN" altLang="en-US" smtClean="0"/>
-              <a:t>‹#›</a:t>
             </a:fld>
             <a:endParaRPr lang="zh-CN" altLang="en-US"/>
           </a:p>
         </p:txBody>
       </p:sp>
     </p:spTree>
-    <p:extLst>
-      <p:ext uri="{BB962C8B-B14F-4D97-AF65-F5344CB8AC3E}">
-        <p14:creationId xmlns:p14="http://schemas.microsoft.com/office/powerpoint/2010/main" val="1612184157"/>
-      </p:ext>
-    </p:extLst>
   </p:cSld>
   <p:clrMapOvr>
     <a:masterClrMapping/>
@@ -1127,6 +1108,7 @@
               <a:rPr lang="zh-CN" altLang="en-US" smtClean="0"/>
               <a:t>单击此处编辑母版文本样式</a:t>
             </a:r>
+            <a:endParaRPr lang="zh-CN" altLang="en-US" smtClean="0"/>
           </a:p>
           <a:p>
             <a:pPr lvl="1"/>
@@ -1134,6 +1116,7 @@
               <a:rPr lang="zh-CN" altLang="en-US" smtClean="0"/>
               <a:t>第二级</a:t>
             </a:r>
+            <a:endParaRPr lang="zh-CN" altLang="en-US" smtClean="0"/>
           </a:p>
           <a:p>
             <a:pPr lvl="2"/>
@@ -1141,6 +1124,7 @@
               <a:rPr lang="zh-CN" altLang="en-US" smtClean="0"/>
               <a:t>第三级</a:t>
             </a:r>
+            <a:endParaRPr lang="zh-CN" altLang="en-US" smtClean="0"/>
           </a:p>
           <a:p>
             <a:pPr lvl="3"/>
@@ -1148,6 +1132,7 @@
               <a:rPr lang="zh-CN" altLang="en-US" smtClean="0"/>
               <a:t>第四级</a:t>
             </a:r>
+            <a:endParaRPr lang="zh-CN" altLang="en-US" smtClean="0"/>
           </a:p>
           <a:p>
             <a:pPr lvl="4"/>
@@ -1184,6 +1169,7 @@
               <a:rPr lang="zh-CN" altLang="en-US" smtClean="0"/>
               <a:t>单击此处编辑母版文本样式</a:t>
             </a:r>
+            <a:endParaRPr lang="zh-CN" altLang="en-US" smtClean="0"/>
           </a:p>
           <a:p>
             <a:pPr lvl="1"/>
@@ -1191,6 +1177,7 @@
               <a:rPr lang="zh-CN" altLang="en-US" smtClean="0"/>
               <a:t>第二级</a:t>
             </a:r>
+            <a:endParaRPr lang="zh-CN" altLang="en-US" smtClean="0"/>
           </a:p>
           <a:p>
             <a:pPr lvl="2"/>
@@ -1198,6 +1185,7 @@
               <a:rPr lang="zh-CN" altLang="en-US" smtClean="0"/>
               <a:t>第三级</a:t>
             </a:r>
+            <a:endParaRPr lang="zh-CN" altLang="en-US" smtClean="0"/>
           </a:p>
           <a:p>
             <a:pPr lvl="3"/>
@@ -1205,6 +1193,7 @@
               <a:rPr lang="zh-CN" altLang="en-US" smtClean="0"/>
               <a:t>第四级</a:t>
             </a:r>
+            <a:endParaRPr lang="zh-CN" altLang="en-US" smtClean="0"/>
           </a:p>
           <a:p>
             <a:pPr lvl="4"/>
@@ -1233,7 +1222,6 @@
           <a:p>
             <a:fld id="{D997B5FA-0921-464F-AAE1-844C04324D75}" type="datetimeFigureOut">
               <a:rPr lang="zh-CN" altLang="en-US" smtClean="0"/>
-              <a:t>2015/5/5</a:t>
             </a:fld>
             <a:endParaRPr lang="zh-CN" altLang="en-US"/>
           </a:p>
@@ -1275,18 +1263,12 @@
           <a:p>
             <a:fld id="{565CE74E-AB26-4998-AD42-012C4C1AD076}" type="slidenum">
               <a:rPr lang="zh-CN" altLang="en-US" smtClean="0"/>
-              <a:t>‹#›</a:t>
             </a:fld>
             <a:endParaRPr lang="zh-CN" altLang="en-US"/>
           </a:p>
         </p:txBody>
       </p:sp>
     </p:spTree>
-    <p:extLst>
-      <p:ext uri="{BB962C8B-B14F-4D97-AF65-F5344CB8AC3E}">
-        <p14:creationId xmlns:p14="http://schemas.microsoft.com/office/powerpoint/2010/main" val="2905825717"/>
-      </p:ext>
-    </p:extLst>
   </p:cSld>
   <p:clrMapOvr>
     <a:masterClrMapping/>
@@ -1401,6 +1383,7 @@
               <a:rPr lang="zh-CN" altLang="en-US" smtClean="0"/>
               <a:t>单击此处编辑母版文本样式</a:t>
             </a:r>
+            <a:endParaRPr lang="zh-CN" altLang="en-US" smtClean="0"/>
           </a:p>
         </p:txBody>
       </p:sp>
@@ -1429,6 +1412,7 @@
               <a:rPr lang="zh-CN" altLang="en-US" smtClean="0"/>
               <a:t>单击此处编辑母版文本样式</a:t>
             </a:r>
+            <a:endParaRPr lang="zh-CN" altLang="en-US" smtClean="0"/>
           </a:p>
           <a:p>
             <a:pPr lvl="1"/>
@@ -1436,6 +1420,7 @@
               <a:rPr lang="zh-CN" altLang="en-US" smtClean="0"/>
               <a:t>第二级</a:t>
             </a:r>
+            <a:endParaRPr lang="zh-CN" altLang="en-US" smtClean="0"/>
           </a:p>
           <a:p>
             <a:pPr lvl="2"/>
@@ -1443,6 +1428,7 @@
               <a:rPr lang="zh-CN" altLang="en-US" smtClean="0"/>
               <a:t>第三级</a:t>
             </a:r>
+            <a:endParaRPr lang="zh-CN" altLang="en-US" smtClean="0"/>
           </a:p>
           <a:p>
             <a:pPr lvl="3"/>
@@ -1450,6 +1436,7 @@
               <a:rPr lang="zh-CN" altLang="en-US" smtClean="0"/>
               <a:t>第四级</a:t>
             </a:r>
+            <a:endParaRPr lang="zh-CN" altLang="en-US" smtClean="0"/>
           </a:p>
           <a:p>
             <a:pPr lvl="4"/>
@@ -1523,6 +1510,7 @@
               <a:rPr lang="zh-CN" altLang="en-US" smtClean="0"/>
               <a:t>单击此处编辑母版文本样式</a:t>
             </a:r>
+            <a:endParaRPr lang="zh-CN" altLang="en-US" smtClean="0"/>
           </a:p>
         </p:txBody>
       </p:sp>
@@ -1551,6 +1539,7 @@
               <a:rPr lang="zh-CN" altLang="en-US" smtClean="0"/>
               <a:t>单击此处编辑母版文本样式</a:t>
             </a:r>
+            <a:endParaRPr lang="zh-CN" altLang="en-US" smtClean="0"/>
           </a:p>
           <a:p>
             <a:pPr lvl="1"/>
@@ -1558,6 +1547,7 @@
               <a:rPr lang="zh-CN" altLang="en-US" smtClean="0"/>
               <a:t>第二级</a:t>
             </a:r>
+            <a:endParaRPr lang="zh-CN" altLang="en-US" smtClean="0"/>
           </a:p>
           <a:p>
             <a:pPr lvl="2"/>
@@ -1565,6 +1555,7 @@
               <a:rPr lang="zh-CN" altLang="en-US" smtClean="0"/>
               <a:t>第三级</a:t>
             </a:r>
+            <a:endParaRPr lang="zh-CN" altLang="en-US" smtClean="0"/>
           </a:p>
           <a:p>
             <a:pPr lvl="3"/>
@@ -1572,6 +1563,7 @@
               <a:rPr lang="zh-CN" altLang="en-US" smtClean="0"/>
               <a:t>第四级</a:t>
             </a:r>
+            <a:endParaRPr lang="zh-CN" altLang="en-US" smtClean="0"/>
           </a:p>
           <a:p>
             <a:pPr lvl="4"/>
@@ -1600,7 +1592,6 @@
           <a:p>
             <a:fld id="{D997B5FA-0921-464F-AAE1-844C04324D75}" type="datetimeFigureOut">
               <a:rPr lang="zh-CN" altLang="en-US" smtClean="0"/>
-              <a:t>2015/5/5</a:t>
             </a:fld>
             <a:endParaRPr lang="zh-CN" altLang="en-US"/>
           </a:p>
@@ -1642,18 +1633,12 @@
           <a:p>
             <a:fld id="{565CE74E-AB26-4998-AD42-012C4C1AD076}" type="slidenum">
               <a:rPr lang="zh-CN" altLang="en-US" smtClean="0"/>
-              <a:t>‹#›</a:t>
             </a:fld>
             <a:endParaRPr lang="zh-CN" altLang="en-US"/>
           </a:p>
         </p:txBody>
       </p:sp>
     </p:spTree>
-    <p:extLst>
-      <p:ext uri="{BB962C8B-B14F-4D97-AF65-F5344CB8AC3E}">
-        <p14:creationId xmlns:p14="http://schemas.microsoft.com/office/powerpoint/2010/main" val="168117047"/>
-      </p:ext>
-    </p:extLst>
   </p:cSld>
   <p:clrMapOvr>
     <a:masterClrMapping/>
@@ -1718,7 +1703,6 @@
           <a:p>
             <a:fld id="{D997B5FA-0921-464F-AAE1-844C04324D75}" type="datetimeFigureOut">
               <a:rPr lang="zh-CN" altLang="en-US" smtClean="0"/>
-              <a:t>2015/5/5</a:t>
             </a:fld>
             <a:endParaRPr lang="zh-CN" altLang="en-US"/>
           </a:p>
@@ -1760,18 +1744,12 @@
           <a:p>
             <a:fld id="{565CE74E-AB26-4998-AD42-012C4C1AD076}" type="slidenum">
               <a:rPr lang="zh-CN" altLang="en-US" smtClean="0"/>
-              <a:t>‹#›</a:t>
             </a:fld>
             <a:endParaRPr lang="zh-CN" altLang="en-US"/>
           </a:p>
         </p:txBody>
       </p:sp>
     </p:spTree>
-    <p:extLst>
-      <p:ext uri="{BB962C8B-B14F-4D97-AF65-F5344CB8AC3E}">
-        <p14:creationId xmlns:p14="http://schemas.microsoft.com/office/powerpoint/2010/main" val="2764406021"/>
-      </p:ext>
-    </p:extLst>
   </p:cSld>
   <p:clrMapOvr>
     <a:masterClrMapping/>
@@ -1813,7 +1791,6 @@
           <a:p>
             <a:fld id="{D997B5FA-0921-464F-AAE1-844C04324D75}" type="datetimeFigureOut">
               <a:rPr lang="zh-CN" altLang="en-US" smtClean="0"/>
-              <a:t>2015/5/5</a:t>
             </a:fld>
             <a:endParaRPr lang="zh-CN" altLang="en-US"/>
           </a:p>
@@ -1855,18 +1832,12 @@
           <a:p>
             <a:fld id="{565CE74E-AB26-4998-AD42-012C4C1AD076}" type="slidenum">
               <a:rPr lang="zh-CN" altLang="en-US" smtClean="0"/>
-              <a:t>‹#›</a:t>
             </a:fld>
             <a:endParaRPr lang="zh-CN" altLang="en-US"/>
           </a:p>
         </p:txBody>
       </p:sp>
     </p:spTree>
-    <p:extLst>
-      <p:ext uri="{BB962C8B-B14F-4D97-AF65-F5344CB8AC3E}">
-        <p14:creationId xmlns:p14="http://schemas.microsoft.com/office/powerpoint/2010/main" val="276523006"/>
-      </p:ext>
-    </p:extLst>
   </p:cSld>
   <p:clrMapOvr>
     <a:masterClrMapping/>
@@ -1976,6 +1947,7 @@
               <a:rPr lang="zh-CN" altLang="en-US" smtClean="0"/>
               <a:t>单击此处编辑母版文本样式</a:t>
             </a:r>
+            <a:endParaRPr lang="zh-CN" altLang="en-US" smtClean="0"/>
           </a:p>
           <a:p>
             <a:pPr lvl="1"/>
@@ -1983,6 +1955,7 @@
               <a:rPr lang="zh-CN" altLang="en-US" smtClean="0"/>
               <a:t>第二级</a:t>
             </a:r>
+            <a:endParaRPr lang="zh-CN" altLang="en-US" smtClean="0"/>
           </a:p>
           <a:p>
             <a:pPr lvl="2"/>
@@ -1990,6 +1963,7 @@
               <a:rPr lang="zh-CN" altLang="en-US" smtClean="0"/>
               <a:t>第三级</a:t>
             </a:r>
+            <a:endParaRPr lang="zh-CN" altLang="en-US" smtClean="0"/>
           </a:p>
           <a:p>
             <a:pPr lvl="3"/>
@@ -1997,6 +1971,7 @@
               <a:rPr lang="zh-CN" altLang="en-US" smtClean="0"/>
               <a:t>第四级</a:t>
             </a:r>
+            <a:endParaRPr lang="zh-CN" altLang="en-US" smtClean="0"/>
           </a:p>
           <a:p>
             <a:pPr lvl="4"/>
@@ -2070,6 +2045,7 @@
               <a:rPr lang="zh-CN" altLang="en-US" smtClean="0"/>
               <a:t>单击此处编辑母版文本样式</a:t>
             </a:r>
+            <a:endParaRPr lang="zh-CN" altLang="en-US" smtClean="0"/>
           </a:p>
         </p:txBody>
       </p:sp>
@@ -2090,7 +2066,6 @@
           <a:p>
             <a:fld id="{D997B5FA-0921-464F-AAE1-844C04324D75}" type="datetimeFigureOut">
               <a:rPr lang="zh-CN" altLang="en-US" smtClean="0"/>
-              <a:t>2015/5/5</a:t>
             </a:fld>
             <a:endParaRPr lang="zh-CN" altLang="en-US"/>
           </a:p>
@@ -2132,18 +2107,12 @@
           <a:p>
             <a:fld id="{565CE74E-AB26-4998-AD42-012C4C1AD076}" type="slidenum">
               <a:rPr lang="zh-CN" altLang="en-US" smtClean="0"/>
-              <a:t>‹#›</a:t>
             </a:fld>
             <a:endParaRPr lang="zh-CN" altLang="en-US"/>
           </a:p>
         </p:txBody>
       </p:sp>
     </p:spTree>
-    <p:extLst>
-      <p:ext uri="{BB962C8B-B14F-4D97-AF65-F5344CB8AC3E}">
-        <p14:creationId xmlns:p14="http://schemas.microsoft.com/office/powerpoint/2010/main" val="694758376"/>
-      </p:ext>
-    </p:extLst>
   </p:cSld>
   <p:clrMapOvr>
     <a:masterClrMapping/>
@@ -2323,6 +2292,7 @@
               <a:rPr lang="zh-CN" altLang="en-US" smtClean="0"/>
               <a:t>单击此处编辑母版文本样式</a:t>
             </a:r>
+            <a:endParaRPr lang="zh-CN" altLang="en-US" smtClean="0"/>
           </a:p>
         </p:txBody>
       </p:sp>
@@ -2343,7 +2313,6 @@
           <a:p>
             <a:fld id="{D997B5FA-0921-464F-AAE1-844C04324D75}" type="datetimeFigureOut">
               <a:rPr lang="zh-CN" altLang="en-US" smtClean="0"/>
-              <a:t>2015/5/5</a:t>
             </a:fld>
             <a:endParaRPr lang="zh-CN" altLang="en-US"/>
           </a:p>
@@ -2385,18 +2354,12 @@
           <a:p>
             <a:fld id="{565CE74E-AB26-4998-AD42-012C4C1AD076}" type="slidenum">
               <a:rPr lang="zh-CN" altLang="en-US" smtClean="0"/>
-              <a:t>‹#›</a:t>
             </a:fld>
             <a:endParaRPr lang="zh-CN" altLang="en-US"/>
           </a:p>
         </p:txBody>
       </p:sp>
     </p:spTree>
-    <p:extLst>
-      <p:ext uri="{BB962C8B-B14F-4D97-AF65-F5344CB8AC3E}">
-        <p14:creationId xmlns:p14="http://schemas.microsoft.com/office/powerpoint/2010/main" val="477805659"/>
-      </p:ext>
-    </p:extLst>
   </p:cSld>
   <p:clrMapOvr>
     <a:masterClrMapping/>
@@ -2489,6 +2452,7 @@
               <a:rPr lang="zh-CN" altLang="en-US" smtClean="0"/>
               <a:t>单击此处编辑母版文本样式</a:t>
             </a:r>
+            <a:endParaRPr lang="zh-CN" altLang="en-US" smtClean="0"/>
           </a:p>
           <a:p>
             <a:pPr lvl="1"/>
@@ -2496,6 +2460,7 @@
               <a:rPr lang="zh-CN" altLang="en-US" smtClean="0"/>
               <a:t>第二级</a:t>
             </a:r>
+            <a:endParaRPr lang="zh-CN" altLang="en-US" smtClean="0"/>
           </a:p>
           <a:p>
             <a:pPr lvl="2"/>
@@ -2503,6 +2468,7 @@
               <a:rPr lang="zh-CN" altLang="en-US" smtClean="0"/>
               <a:t>第三级</a:t>
             </a:r>
+            <a:endParaRPr lang="zh-CN" altLang="en-US" smtClean="0"/>
           </a:p>
           <a:p>
             <a:pPr lvl="3"/>
@@ -2510,6 +2476,7 @@
               <a:rPr lang="zh-CN" altLang="en-US" smtClean="0"/>
               <a:t>第四级</a:t>
             </a:r>
+            <a:endParaRPr lang="zh-CN" altLang="en-US" smtClean="0"/>
           </a:p>
           <a:p>
             <a:pPr lvl="4"/>
@@ -2556,7 +2523,6 @@
           <a:p>
             <a:fld id="{D997B5FA-0921-464F-AAE1-844C04324D75}" type="datetimeFigureOut">
               <a:rPr lang="zh-CN" altLang="en-US" smtClean="0"/>
-              <a:t>2015/5/5</a:t>
             </a:fld>
             <a:endParaRPr lang="zh-CN" altLang="en-US"/>
           </a:p>
@@ -2634,18 +2600,12 @@
           <a:p>
             <a:fld id="{565CE74E-AB26-4998-AD42-012C4C1AD076}" type="slidenum">
               <a:rPr lang="zh-CN" altLang="en-US" smtClean="0"/>
-              <a:t>‹#›</a:t>
             </a:fld>
             <a:endParaRPr lang="zh-CN" altLang="en-US"/>
           </a:p>
         </p:txBody>
       </p:sp>
     </p:spTree>
-    <p:extLst>
-      <p:ext uri="{BB962C8B-B14F-4D97-AF65-F5344CB8AC3E}">
-        <p14:creationId xmlns:p14="http://schemas.microsoft.com/office/powerpoint/2010/main" val="2003094035"/>
-      </p:ext>
-    </p:extLst>
   </p:cSld>
   <p:clrMap bg1="lt1" tx1="dk1" bg2="lt2" tx2="dk2" accent1="accent1" accent2="accent2" accent3="accent3" accent4="accent4" accent5="accent5" accent6="accent6" hlink="hlink" folHlink="folHlink"/>
   <p:sldLayoutIdLst>
@@ -2944,6 +2904,60 @@
 </p:sldMaster>
 </file>
 
+<file path=ppt/slides/slide1.xml><?xml version="1.0" encoding="utf-8"?>
+<p:sld xmlns:a="http://schemas.openxmlformats.org/drawingml/2006/main" xmlns:r="http://schemas.openxmlformats.org/officeDocument/2006/relationships" xmlns:p="http://schemas.openxmlformats.org/presentationml/2006/main">
+  <p:cSld>
+    <p:spTree>
+      <p:nvGrpSpPr>
+        <p:cNvPr id="1" name=""/>
+        <p:cNvGrpSpPr/>
+        <p:nvPr/>
+      </p:nvGrpSpPr>
+      <p:grpSpPr/>
+      <p:sp>
+        <p:nvSpPr>
+          <p:cNvPr id="2" name="标题 1"/>
+          <p:cNvSpPr>
+            <a:spLocks noGrp="1"/>
+          </p:cNvSpPr>
+          <p:nvPr>
+            <p:ph type="ctrTitle"/>
+          </p:nvPr>
+        </p:nvSpPr>
+        <p:spPr/>
+        <p:txBody>
+          <a:bodyPr/>
+          <a:p>
+            <a:endParaRPr lang="zh-CN" altLang="en-US"/>
+          </a:p>
+        </p:txBody>
+      </p:sp>
+      <p:sp>
+        <p:nvSpPr>
+          <p:cNvPr id="3" name="副标题 2"/>
+          <p:cNvSpPr>
+            <a:spLocks noGrp="1"/>
+          </p:cNvSpPr>
+          <p:nvPr>
+            <p:ph type="subTitle" idx="1"/>
+          </p:nvPr>
+        </p:nvSpPr>
+        <p:spPr/>
+        <p:txBody>
+          <a:bodyPr/>
+          <a:p>
+            <a:endParaRPr lang="zh-CN" altLang="en-US"/>
+          </a:p>
+        </p:txBody>
+      </p:sp>
+    </p:spTree>
+  </p:cSld>
+  <p:clrMapOvr>
+    <a:masterClrMapping/>
+  </p:clrMapOvr>
+</p:sld>
+</file>
+
 <file path=ppt/theme/theme1.xml><?xml version="1.0" encoding="utf-8"?>
 <a:theme xmlns:a="http://schemas.openxmlformats.org/drawingml/2006/main" name="Office 主题">
   <a:themeElements>
@@ -3195,8 +3209,6 @@
       </a:bgFillStyleLst>
     </a:fmtScheme>
   </a:themeElements>
-  <a:objectDefaults/>
-  <a:extraClrSchemeLst/>
   <a:extLst>
     <a:ext uri="{05A4C25C-085E-4340-85A3-A5531E510DB2}">
       <thm15:themeFamily xmlns:thm15="http://schemas.microsoft.com/office/thememl/2012/main" name="Office Theme" id="{62F939B6-93AF-4DB8-9C6B-D6C7DFDC589F}" vid="{4A3C46E8-61CC-4603-A589-7422A47A8E4A}"/>

</xml_diff>

<commit_message>
3.19: Complete Math Analyze
</commit_message>
<xml_diff>
--- a/English/Presentation/pre.pptx
+++ b/English/Presentation/pre.pptx
@@ -4,8 +4,16 @@
   <p:sldMasterIdLst>
     <p:sldMasterId id="2147483648" r:id="rId1"/>
   </p:sldMasterIdLst>
+  <p:notesMasterIdLst>
+    <p:notesMasterId r:id="rId4"/>
+  </p:notesMasterIdLst>
   <p:sldIdLst>
-    <p:sldId id="256" r:id="rId3"/>
+    <p:sldId id="257" r:id="rId3"/>
+    <p:sldId id="261" r:id="rId5"/>
+    <p:sldId id="256" r:id="rId6"/>
+    <p:sldId id="259" r:id="rId7"/>
+    <p:sldId id="260" r:id="rId8"/>
+    <p:sldId id="263" r:id="rId9"/>
   </p:sldIdLst>
   <p:sldSz cx="12192000" cy="6858000"/>
   <p:notesSz cx="6858000" cy="9144000"/>
@@ -105,6 +113,397 @@
     </a:lvl9pPr>
   </p:defaultTextStyle>
 </p:presentation>
+</file>
+
+<file path=ppt/notesMasters/notesMaster1.xml><?xml version="1.0" encoding="utf-8"?>
+<p:notesMaster xmlns:a="http://schemas.openxmlformats.org/drawingml/2006/main" xmlns:r="http://schemas.openxmlformats.org/officeDocument/2006/relationships" xmlns:p="http://schemas.openxmlformats.org/presentationml/2006/main">
+  <p:cSld>
+    <p:bg>
+      <p:bgRef idx="1001">
+        <a:schemeClr val="bg1"/>
+      </p:bgRef>
+    </p:bg>
+    <p:spTree>
+      <p:nvGrpSpPr>
+        <p:cNvPr id="1" name=""/>
+        <p:cNvGrpSpPr/>
+        <p:nvPr/>
+      </p:nvGrpSpPr>
+      <p:grpSpPr>
+        <a:xfrm>
+          <a:off x="0" y="0"/>
+          <a:ext cx="0" cy="0"/>
+          <a:chOff x="0" y="0"/>
+          <a:chExt cx="0" cy="0"/>
+        </a:xfrm>
+      </p:grpSpPr>
+      <p:sp>
+        <p:nvSpPr>
+          <p:cNvPr id="2" name="页眉占位符 1"/>
+          <p:cNvSpPr>
+            <a:spLocks noGrp="1"/>
+          </p:cNvSpPr>
+          <p:nvPr>
+            <p:ph type="hdr" sz="quarter"/>
+          </p:nvPr>
+        </p:nvSpPr>
+        <p:spPr>
+          <a:xfrm>
+            <a:off x="0" y="0"/>
+            <a:ext cx="2971800" cy="458788"/>
+          </a:xfrm>
+          <a:prstGeom prst="rect">
+            <a:avLst/>
+          </a:prstGeom>
+        </p:spPr>
+        <p:txBody>
+          <a:bodyPr vert="horz" lIns="91440" tIns="45720" rIns="91440" bIns="45720" rtlCol="0"/>
+          <a:lstStyle>
+            <a:lvl1pPr algn="l">
+              <a:defRPr sz="1200"/>
+            </a:lvl1pPr>
+          </a:lstStyle>
+          <a:p>
+            <a:endParaRPr lang="zh-CN" altLang="en-US"/>
+          </a:p>
+        </p:txBody>
+      </p:sp>
+      <p:sp>
+        <p:nvSpPr>
+          <p:cNvPr id="3" name="日期占位符 2"/>
+          <p:cNvSpPr>
+            <a:spLocks noGrp="1"/>
+          </p:cNvSpPr>
+          <p:nvPr>
+            <p:ph type="dt" idx="1"/>
+          </p:nvPr>
+        </p:nvSpPr>
+        <p:spPr>
+          <a:xfrm>
+            <a:off x="3884613" y="0"/>
+            <a:ext cx="2971800" cy="458788"/>
+          </a:xfrm>
+          <a:prstGeom prst="rect">
+            <a:avLst/>
+          </a:prstGeom>
+        </p:spPr>
+        <p:txBody>
+          <a:bodyPr vert="horz" lIns="91440" tIns="45720" rIns="91440" bIns="45720" rtlCol="0"/>
+          <a:lstStyle>
+            <a:lvl1pPr algn="r">
+              <a:defRPr sz="1200"/>
+            </a:lvl1pPr>
+          </a:lstStyle>
+          <a:p>
+            <a:fld id="{D2A48B96-639E-45A3-A0BA-2464DFDB1FAA}" type="datetimeFigureOut">
+              <a:rPr lang="zh-CN" altLang="en-US" smtClean="0"/>
+            </a:fld>
+            <a:endParaRPr lang="zh-CN" altLang="en-US"/>
+          </a:p>
+        </p:txBody>
+      </p:sp>
+      <p:sp>
+        <p:nvSpPr>
+          <p:cNvPr id="4" name="幻灯片图像占位符 3"/>
+          <p:cNvSpPr>
+            <a:spLocks noGrp="1" noRot="1" noChangeAspect="1"/>
+          </p:cNvSpPr>
+          <p:nvPr>
+            <p:ph type="sldImg" idx="2"/>
+          </p:nvPr>
+        </p:nvSpPr>
+        <p:spPr>
+          <a:xfrm>
+            <a:off x="685800" y="1143000"/>
+            <a:ext cx="5486400" cy="3086100"/>
+          </a:xfrm>
+          <a:prstGeom prst="rect">
+            <a:avLst/>
+          </a:prstGeom>
+          <a:noFill/>
+          <a:ln w="12700">
+            <a:solidFill>
+              <a:prstClr val="black"/>
+            </a:solidFill>
+          </a:ln>
+        </p:spPr>
+        <p:txBody>
+          <a:bodyPr vert="horz" lIns="91440" tIns="45720" rIns="91440" bIns="45720" rtlCol="0" anchor="ctr"/>
+          <a:lstStyle/>
+          <a:p>
+            <a:endParaRPr lang="zh-CN" altLang="en-US"/>
+          </a:p>
+        </p:txBody>
+      </p:sp>
+      <p:sp>
+        <p:nvSpPr>
+          <p:cNvPr id="5" name="备注占位符 4"/>
+          <p:cNvSpPr>
+            <a:spLocks noGrp="1"/>
+          </p:cNvSpPr>
+          <p:nvPr>
+            <p:ph type="body" sz="quarter" idx="3"/>
+          </p:nvPr>
+        </p:nvSpPr>
+        <p:spPr>
+          <a:xfrm>
+            <a:off x="685800" y="4400550"/>
+            <a:ext cx="5486400" cy="3600450"/>
+          </a:xfrm>
+          <a:prstGeom prst="rect">
+            <a:avLst/>
+          </a:prstGeom>
+        </p:spPr>
+        <p:txBody>
+          <a:bodyPr vert="horz" lIns="91440" tIns="45720" rIns="91440" bIns="45720" rtlCol="0"/>
+          <a:lstStyle/>
+          <a:p>
+            <a:pPr lvl="0"/>
+            <a:r>
+              <a:rPr lang="zh-CN" altLang="en-US" smtClean="0"/>
+              <a:t>单击此处编辑母版文本样式</a:t>
+            </a:r>
+            <a:endParaRPr lang="zh-CN" altLang="en-US" smtClean="0"/>
+          </a:p>
+          <a:p>
+            <a:pPr lvl="1"/>
+            <a:r>
+              <a:rPr lang="zh-CN" altLang="en-US" smtClean="0"/>
+              <a:t>第二级</a:t>
+            </a:r>
+            <a:endParaRPr lang="zh-CN" altLang="en-US" smtClean="0"/>
+          </a:p>
+          <a:p>
+            <a:pPr lvl="2"/>
+            <a:r>
+              <a:rPr lang="zh-CN" altLang="en-US" smtClean="0"/>
+              <a:t>第三级</a:t>
+            </a:r>
+            <a:endParaRPr lang="zh-CN" altLang="en-US" smtClean="0"/>
+          </a:p>
+          <a:p>
+            <a:pPr lvl="3"/>
+            <a:r>
+              <a:rPr lang="zh-CN" altLang="en-US" smtClean="0"/>
+              <a:t>第四级</a:t>
+            </a:r>
+            <a:endParaRPr lang="zh-CN" altLang="en-US" smtClean="0"/>
+          </a:p>
+          <a:p>
+            <a:pPr lvl="4"/>
+            <a:r>
+              <a:rPr lang="zh-CN" altLang="en-US" smtClean="0"/>
+              <a:t>第五级</a:t>
+            </a:r>
+            <a:endParaRPr lang="zh-CN" altLang="en-US"/>
+          </a:p>
+        </p:txBody>
+      </p:sp>
+      <p:sp>
+        <p:nvSpPr>
+          <p:cNvPr id="6" name="页脚占位符 5"/>
+          <p:cNvSpPr>
+            <a:spLocks noGrp="1"/>
+          </p:cNvSpPr>
+          <p:nvPr>
+            <p:ph type="ftr" sz="quarter" idx="4"/>
+          </p:nvPr>
+        </p:nvSpPr>
+        <p:spPr>
+          <a:xfrm>
+            <a:off x="0" y="8685213"/>
+            <a:ext cx="2971800" cy="458787"/>
+          </a:xfrm>
+          <a:prstGeom prst="rect">
+            <a:avLst/>
+          </a:prstGeom>
+        </p:spPr>
+        <p:txBody>
+          <a:bodyPr vert="horz" lIns="91440" tIns="45720" rIns="91440" bIns="45720" rtlCol="0" anchor="b"/>
+          <a:lstStyle>
+            <a:lvl1pPr algn="l">
+              <a:defRPr sz="1200"/>
+            </a:lvl1pPr>
+          </a:lstStyle>
+          <a:p>
+            <a:endParaRPr lang="zh-CN" altLang="en-US"/>
+          </a:p>
+        </p:txBody>
+      </p:sp>
+      <p:sp>
+        <p:nvSpPr>
+          <p:cNvPr id="7" name="灯片编号占位符 6"/>
+          <p:cNvSpPr>
+            <a:spLocks noGrp="1"/>
+          </p:cNvSpPr>
+          <p:nvPr>
+            <p:ph type="sldNum" sz="quarter" idx="5"/>
+          </p:nvPr>
+        </p:nvSpPr>
+        <p:spPr>
+          <a:xfrm>
+            <a:off x="3884613" y="8685213"/>
+            <a:ext cx="2971800" cy="458787"/>
+          </a:xfrm>
+          <a:prstGeom prst="rect">
+            <a:avLst/>
+          </a:prstGeom>
+        </p:spPr>
+        <p:txBody>
+          <a:bodyPr vert="horz" lIns="91440" tIns="45720" rIns="91440" bIns="45720" rtlCol="0" anchor="b"/>
+          <a:lstStyle>
+            <a:lvl1pPr algn="r">
+              <a:defRPr sz="1200"/>
+            </a:lvl1pPr>
+          </a:lstStyle>
+          <a:p>
+            <a:fld id="{A6837353-30EB-4A48-80EB-173D804AEFBD}" type="slidenum">
+              <a:rPr lang="zh-CN" altLang="en-US" smtClean="0"/>
+            </a:fld>
+            <a:endParaRPr lang="zh-CN" altLang="en-US"/>
+          </a:p>
+        </p:txBody>
+      </p:sp>
+    </p:spTree>
+  </p:cSld>
+  <p:clrMap bg1="lt1" tx1="dk1" bg2="lt2" tx2="dk2" accent1="accent1" accent2="accent2" accent3="accent3" accent4="accent4" accent5="accent5" accent6="accent6" hlink="hlink" folHlink="folHlink"/>
+  <p:notesStyle>
+    <a:lvl1pPr marL="0" algn="l" defTabSz="914400" rtl="0" eaLnBrk="1" latinLnBrk="0" hangingPunct="1">
+      <a:defRPr sz="1200" kern="1200">
+        <a:solidFill>
+          <a:schemeClr val="tx1"/>
+        </a:solidFill>
+        <a:latin typeface="+mn-lt"/>
+        <a:ea typeface="+mn-ea"/>
+        <a:cs typeface="+mn-cs"/>
+      </a:defRPr>
+    </a:lvl1pPr>
+    <a:lvl2pPr marL="457200" algn="l" defTabSz="914400" rtl="0" eaLnBrk="1" latinLnBrk="0" hangingPunct="1">
+      <a:defRPr sz="1200" kern="1200">
+        <a:solidFill>
+          <a:schemeClr val="tx1"/>
+        </a:solidFill>
+        <a:latin typeface="+mn-lt"/>
+        <a:ea typeface="+mn-ea"/>
+        <a:cs typeface="+mn-cs"/>
+      </a:defRPr>
+    </a:lvl2pPr>
+    <a:lvl3pPr marL="914400" algn="l" defTabSz="914400" rtl="0" eaLnBrk="1" latinLnBrk="0" hangingPunct="1">
+      <a:defRPr sz="1200" kern="1200">
+        <a:solidFill>
+          <a:schemeClr val="tx1"/>
+        </a:solidFill>
+        <a:latin typeface="+mn-lt"/>
+        <a:ea typeface="+mn-ea"/>
+        <a:cs typeface="+mn-cs"/>
+      </a:defRPr>
+    </a:lvl3pPr>
+    <a:lvl4pPr marL="1371600" algn="l" defTabSz="914400" rtl="0" eaLnBrk="1" latinLnBrk="0" hangingPunct="1">
+      <a:defRPr sz="1200" kern="1200">
+        <a:solidFill>
+          <a:schemeClr val="tx1"/>
+        </a:solidFill>
+        <a:latin typeface="+mn-lt"/>
+        <a:ea typeface="+mn-ea"/>
+        <a:cs typeface="+mn-cs"/>
+      </a:defRPr>
+    </a:lvl4pPr>
+    <a:lvl5pPr marL="1828800" algn="l" defTabSz="914400" rtl="0" eaLnBrk="1" latinLnBrk="0" hangingPunct="1">
+      <a:defRPr sz="1200" kern="1200">
+        <a:solidFill>
+          <a:schemeClr val="tx1"/>
+        </a:solidFill>
+        <a:latin typeface="+mn-lt"/>
+        <a:ea typeface="+mn-ea"/>
+        <a:cs typeface="+mn-cs"/>
+      </a:defRPr>
+    </a:lvl5pPr>
+    <a:lvl6pPr marL="2286000" algn="l" defTabSz="914400" rtl="0" eaLnBrk="1" latinLnBrk="0" hangingPunct="1">
+      <a:defRPr sz="1200" kern="1200">
+        <a:solidFill>
+          <a:schemeClr val="tx1"/>
+        </a:solidFill>
+        <a:latin typeface="+mn-lt"/>
+        <a:ea typeface="+mn-ea"/>
+        <a:cs typeface="+mn-cs"/>
+      </a:defRPr>
+    </a:lvl6pPr>
+    <a:lvl7pPr marL="2743200" algn="l" defTabSz="914400" rtl="0" eaLnBrk="1" latinLnBrk="0" hangingPunct="1">
+      <a:defRPr sz="1200" kern="1200">
+        <a:solidFill>
+          <a:schemeClr val="tx1"/>
+        </a:solidFill>
+        <a:latin typeface="+mn-lt"/>
+        <a:ea typeface="+mn-ea"/>
+        <a:cs typeface="+mn-cs"/>
+      </a:defRPr>
+    </a:lvl7pPr>
+    <a:lvl8pPr marL="3200400" algn="l" defTabSz="914400" rtl="0" eaLnBrk="1" latinLnBrk="0" hangingPunct="1">
+      <a:defRPr sz="1200" kern="1200">
+        <a:solidFill>
+          <a:schemeClr val="tx1"/>
+        </a:solidFill>
+        <a:latin typeface="+mn-lt"/>
+        <a:ea typeface="+mn-ea"/>
+        <a:cs typeface="+mn-cs"/>
+      </a:defRPr>
+    </a:lvl8pPr>
+    <a:lvl9pPr marL="3657600" algn="l" defTabSz="914400" rtl="0" eaLnBrk="1" latinLnBrk="0" hangingPunct="1">
+      <a:defRPr sz="1200" kern="1200">
+        <a:solidFill>
+          <a:schemeClr val="tx1"/>
+        </a:solidFill>
+        <a:latin typeface="+mn-lt"/>
+        <a:ea typeface="+mn-ea"/>
+        <a:cs typeface="+mn-cs"/>
+      </a:defRPr>
+    </a:lvl9pPr>
+  </p:notesStyle>
+</p:notesMaster>
+</file>
+
+<file path=ppt/notesSlides/notesSlide1.xml><?xml version="1.0" encoding="utf-8"?>
+<p:notes xmlns:a="http://schemas.openxmlformats.org/drawingml/2006/main" xmlns:r="http://schemas.openxmlformats.org/officeDocument/2006/relationships" xmlns:p="http://schemas.openxmlformats.org/presentationml/2006/main">
+  <p:cSld>
+    <p:spTree>
+      <p:nvGrpSpPr>
+        <p:cNvPr id="1" name=""/>
+        <p:cNvGrpSpPr/>
+        <p:nvPr/>
+      </p:nvGrpSpPr>
+      <p:grpSpPr/>
+      <p:sp>
+        <p:nvSpPr>
+          <p:cNvPr id="2" name="幻灯片图像占位符 1"/>
+          <p:cNvSpPr/>
+          <p:nvPr>
+            <p:ph type="sldImg" idx="2"/>
+          </p:nvPr>
+        </p:nvSpPr>
+        <p:spPr/>
+      </p:sp>
+      <p:sp>
+        <p:nvSpPr>
+          <p:cNvPr id="3" name="文本占位符 2"/>
+          <p:cNvSpPr/>
+          <p:nvPr>
+            <p:ph type="body" idx="3"/>
+          </p:nvPr>
+        </p:nvSpPr>
+        <p:spPr/>
+        <p:txBody>
+          <a:bodyPr/>
+          <a:p>
+            <a:endParaRPr lang="zh-CN" altLang="en-US"/>
+          </a:p>
+        </p:txBody>
+      </p:sp>
+    </p:spTree>
+  </p:cSld>
+  <p:clrMapOvr>
+    <a:masterClrMapping/>
+  </p:clrMapOvr>
+</p:notes>
 </file>
 
 <file path=ppt/slideLayouts/slideLayout1.xml><?xml version="1.0" encoding="utf-8"?>
@@ -2914,48 +3313,1420 @@
         <p:nvPr/>
       </p:nvGrpSpPr>
       <p:grpSpPr/>
-      <p:sp>
-        <p:nvSpPr>
-          <p:cNvPr id="2" name="标题 1"/>
-          <p:cNvSpPr>
-            <a:spLocks noGrp="1"/>
-          </p:cNvSpPr>
-          <p:nvPr>
-            <p:ph type="ctrTitle"/>
-          </p:nvPr>
-        </p:nvSpPr>
-        <p:spPr/>
-        <p:txBody>
-          <a:bodyPr/>
-          <a:p>
-            <a:endParaRPr lang="zh-CN" altLang="en-US"/>
-          </a:p>
-        </p:txBody>
-      </p:sp>
-      <p:sp>
-        <p:nvSpPr>
-          <p:cNvPr id="3" name="副标题 2"/>
-          <p:cNvSpPr>
-            <a:spLocks noGrp="1"/>
-          </p:cNvSpPr>
-          <p:nvPr>
-            <p:ph type="subTitle" idx="1"/>
-          </p:nvPr>
-        </p:nvSpPr>
-        <p:spPr/>
-        <p:txBody>
-          <a:bodyPr/>
-          <a:p>
-            <a:endParaRPr lang="zh-CN" altLang="en-US"/>
-          </a:p>
-        </p:txBody>
-      </p:sp>
+      <p:grpSp>
+        <p:nvGrpSpPr>
+          <p:cNvPr id="15" name="组合 14"/>
+          <p:cNvGrpSpPr/>
+          <p:nvPr/>
+        </p:nvGrpSpPr>
+        <p:grpSpPr>
+          <a:xfrm>
+            <a:off x="0" y="779145"/>
+            <a:ext cx="6492240" cy="5299710"/>
+            <a:chOff x="0" y="572"/>
+            <a:chExt cx="10224" cy="8346"/>
+          </a:xfrm>
+        </p:grpSpPr>
+        <p:sp>
+          <p:nvSpPr>
+            <p:cNvPr id="8" name="文本框 7"/>
+            <p:cNvSpPr txBox="1"/>
+            <p:nvPr/>
+          </p:nvSpPr>
+          <p:spPr>
+            <a:xfrm>
+              <a:off x="0" y="1701"/>
+              <a:ext cx="10225" cy="4021"/>
+            </a:xfrm>
+            <a:prstGeom prst="rect">
+              <a:avLst/>
+            </a:prstGeom>
+            <a:noFill/>
+          </p:spPr>
+          <p:txBody>
+            <a:bodyPr wrap="square" rtlCol="0">
+              <a:spAutoFit/>
+            </a:bodyPr>
+            <a:p>
+              <a:pPr algn="ctr"/>
+              <a:r>
+                <a:rPr lang="en-US" altLang="zh-CN" sz="16000" b="1">
+                  <a:solidFill>
+                    <a:srgbClr val="303030"/>
+                  </a:solidFill>
+                </a:rPr>
+                <a:t>BOOK</a:t>
+              </a:r>
+              <a:endParaRPr lang="en-US" altLang="zh-CN" sz="16000" b="1">
+                <a:solidFill>
+                  <a:srgbClr val="303030"/>
+                </a:solidFill>
+              </a:endParaRPr>
+            </a:p>
+          </p:txBody>
+        </p:sp>
+        <p:sp>
+          <p:nvSpPr>
+            <p:cNvPr id="9" name="文本框 8"/>
+            <p:cNvSpPr txBox="1"/>
+            <p:nvPr/>
+          </p:nvSpPr>
+          <p:spPr>
+            <a:xfrm>
+              <a:off x="1245" y="572"/>
+              <a:ext cx="5618" cy="2082"/>
+            </a:xfrm>
+            <a:prstGeom prst="rect">
+              <a:avLst/>
+            </a:prstGeom>
+            <a:noFill/>
+          </p:spPr>
+          <p:txBody>
+            <a:bodyPr wrap="square" rtlCol="0">
+              <a:spAutoFit/>
+            </a:bodyPr>
+            <a:p>
+              <a:pPr algn="l"/>
+              <a:r>
+                <a:rPr lang="en-US" altLang="zh-CN" sz="8000">
+                  <a:solidFill>
+                    <a:srgbClr val="787878"/>
+                  </a:solidFill>
+                </a:rPr>
+                <a:t>THE</a:t>
+              </a:r>
+              <a:endParaRPr lang="en-US" altLang="zh-CN" sz="8000">
+                <a:solidFill>
+                  <a:srgbClr val="787878"/>
+                </a:solidFill>
+              </a:endParaRPr>
+            </a:p>
+          </p:txBody>
+        </p:sp>
+        <p:sp>
+          <p:nvSpPr>
+            <p:cNvPr id="10" name="文本框 9"/>
+            <p:cNvSpPr txBox="1"/>
+            <p:nvPr/>
+          </p:nvSpPr>
+          <p:spPr>
+            <a:xfrm>
+              <a:off x="1245" y="4898"/>
+              <a:ext cx="6466" cy="4021"/>
+            </a:xfrm>
+            <a:prstGeom prst="rect">
+              <a:avLst/>
+            </a:prstGeom>
+            <a:noFill/>
+          </p:spPr>
+          <p:txBody>
+            <a:bodyPr wrap="square" rtlCol="0">
+              <a:spAutoFit/>
+            </a:bodyPr>
+            <a:p>
+              <a:pPr algn="l"/>
+              <a:r>
+                <a:rPr lang="en-US" altLang="zh-CN" sz="8000">
+                  <a:solidFill>
+                    <a:srgbClr val="787878"/>
+                  </a:solidFill>
+                </a:rPr>
+                <a:t>WE</a:t>
+              </a:r>
+              <a:endParaRPr lang="en-US" altLang="zh-CN" sz="8000">
+                <a:solidFill>
+                  <a:srgbClr val="787878"/>
+                </a:solidFill>
+              </a:endParaRPr>
+            </a:p>
+            <a:p>
+              <a:pPr algn="l"/>
+              <a:r>
+                <a:rPr lang="en-US" altLang="zh-CN" sz="8000">
+                  <a:solidFill>
+                    <a:srgbClr val="787878"/>
+                  </a:solidFill>
+                </a:rPr>
+                <a:t>ENJOY</a:t>
+              </a:r>
+              <a:endParaRPr lang="en-US" altLang="zh-CN" sz="8000">
+                <a:solidFill>
+                  <a:srgbClr val="787878"/>
+                </a:solidFill>
+              </a:endParaRPr>
+            </a:p>
+          </p:txBody>
+        </p:sp>
+      </p:grpSp>
+      <p:grpSp>
+        <p:nvGrpSpPr>
+          <p:cNvPr id="20" name="组合 19"/>
+          <p:cNvGrpSpPr/>
+          <p:nvPr/>
+        </p:nvGrpSpPr>
+        <p:grpSpPr>
+          <a:xfrm>
+            <a:off x="4896485" y="86360"/>
+            <a:ext cx="7034530" cy="6684645"/>
+            <a:chOff x="7711" y="0"/>
+            <a:chExt cx="11078" cy="10527"/>
+          </a:xfrm>
+        </p:grpSpPr>
+        <p:pic>
+          <p:nvPicPr>
+            <p:cNvPr id="18" name="图片 17" descr="question"/>
+            <p:cNvPicPr>
+              <a:picLocks noChangeAspect="1"/>
+            </p:cNvPicPr>
+            <p:nvPr/>
+          </p:nvPicPr>
+          <p:blipFill>
+            <a:blip r:embed="rId1"/>
+            <a:stretch>
+              <a:fillRect/>
+            </a:stretch>
+          </p:blipFill>
+          <p:spPr>
+            <a:xfrm>
+              <a:off x="10242" y="2399"/>
+              <a:ext cx="8128" cy="8128"/>
+            </a:xfrm>
+            <a:prstGeom prst="rect">
+              <a:avLst/>
+            </a:prstGeom>
+          </p:spPr>
+        </p:pic>
+        <p:sp>
+          <p:nvSpPr>
+            <p:cNvPr id="19" name="文本框 18"/>
+            <p:cNvSpPr txBox="1"/>
+            <p:nvPr/>
+          </p:nvSpPr>
+          <p:spPr>
+            <a:xfrm>
+              <a:off x="7711" y="0"/>
+              <a:ext cx="11079" cy="2567"/>
+            </a:xfrm>
+            <a:prstGeom prst="rect">
+              <a:avLst/>
+            </a:prstGeom>
+            <a:noFill/>
+          </p:spPr>
+          <p:txBody>
+            <a:bodyPr wrap="square" rtlCol="0">
+              <a:spAutoFit/>
+            </a:bodyPr>
+            <a:p>
+              <a:pPr algn="r"/>
+              <a:r>
+                <a:rPr lang="en-US" altLang="zh-CN" sz="10000" b="1">
+                  <a:solidFill>
+                    <a:srgbClr val="303030"/>
+                  </a:solidFill>
+                </a:rPr>
+                <a:t>HANDOUT</a:t>
+              </a:r>
+              <a:endParaRPr lang="en-US" altLang="zh-CN" sz="10000" b="1">
+                <a:solidFill>
+                  <a:srgbClr val="303030"/>
+                </a:solidFill>
+              </a:endParaRPr>
+            </a:p>
+          </p:txBody>
+        </p:sp>
+      </p:grpSp>
+      <p:grpSp>
+        <p:nvGrpSpPr>
+          <p:cNvPr id="4" name="组合 3"/>
+          <p:cNvGrpSpPr/>
+          <p:nvPr/>
+        </p:nvGrpSpPr>
+        <p:grpSpPr>
+          <a:xfrm>
+            <a:off x="6066155" y="152400"/>
+            <a:ext cx="6015990" cy="6490970"/>
+            <a:chOff x="9553" y="240"/>
+            <a:chExt cx="9474" cy="10222"/>
+          </a:xfrm>
+        </p:grpSpPr>
+        <p:pic>
+          <p:nvPicPr>
+            <p:cNvPr id="7" name="图片 6" descr="book2"/>
+            <p:cNvPicPr>
+              <a:picLocks noChangeAspect="1"/>
+            </p:cNvPicPr>
+            <p:nvPr>
+              <p:custDataLst>
+                <p:tags r:id="rId2"/>
+              </p:custDataLst>
+            </p:nvPr>
+          </p:nvPicPr>
+          <p:blipFill>
+            <a:blip r:embed="rId3"/>
+            <a:stretch>
+              <a:fillRect/>
+            </a:stretch>
+          </p:blipFill>
+          <p:spPr>
+            <a:xfrm>
+              <a:off x="9553" y="4252"/>
+              <a:ext cx="9474" cy="6211"/>
+            </a:xfrm>
+            <a:prstGeom prst="rect">
+              <a:avLst/>
+            </a:prstGeom>
+          </p:spPr>
+        </p:pic>
+        <p:sp>
+          <p:nvSpPr>
+            <p:cNvPr id="2" name="文本框 1"/>
+            <p:cNvSpPr txBox="1"/>
+            <p:nvPr/>
+          </p:nvSpPr>
+          <p:spPr>
+            <a:xfrm>
+              <a:off x="14367" y="240"/>
+              <a:ext cx="4494" cy="3633"/>
+            </a:xfrm>
+            <a:prstGeom prst="rect">
+              <a:avLst/>
+            </a:prstGeom>
+            <a:noFill/>
+          </p:spPr>
+          <p:txBody>
+            <a:bodyPr wrap="square" rtlCol="0">
+              <a:spAutoFit/>
+            </a:bodyPr>
+            <a:p>
+              <a:pPr algn="r"/>
+              <a:r>
+                <a:rPr lang="en-US" altLang="zh-CN" sz="4800">
+                  <a:solidFill>
+                    <a:srgbClr val="787878"/>
+                  </a:solidFill>
+                </a:rPr>
+                <a:t>Presenter</a:t>
+              </a:r>
+              <a:endParaRPr lang="en-US" altLang="zh-CN" sz="4800">
+                <a:solidFill>
+                  <a:srgbClr val="787878"/>
+                </a:solidFill>
+              </a:endParaRPr>
+            </a:p>
+            <a:p>
+              <a:pPr algn="r"/>
+              <a:r>
+                <a:rPr lang="zh-CN" altLang="en-US" sz="4800">
+                  <a:solidFill>
+                    <a:srgbClr val="787878"/>
+                  </a:solidFill>
+                </a:rPr>
+                <a:t>方盛俊</a:t>
+              </a:r>
+              <a:endParaRPr lang="en-US" altLang="zh-CN" sz="4800">
+                <a:solidFill>
+                  <a:srgbClr val="787878"/>
+                </a:solidFill>
+              </a:endParaRPr>
+            </a:p>
+            <a:p>
+              <a:pPr algn="l"/>
+              <a:endParaRPr lang="zh-CN" altLang="en-US" sz="4800">
+                <a:solidFill>
+                  <a:srgbClr val="787878"/>
+                </a:solidFill>
+              </a:endParaRPr>
+            </a:p>
+          </p:txBody>
+        </p:sp>
+      </p:grpSp>
+    </p:spTree>
+    <p:custDataLst>
+      <p:tags r:id="rId4"/>
+    </p:custDataLst>
+  </p:cSld>
+  <p:clrMapOvr>
+    <a:masterClrMapping/>
+  </p:clrMapOvr>
+  <p:timing>
+    <p:tnLst>
+      <p:par>
+        <p:cTn id="1" dur="indefinite" restart="never" nodeType="tmRoot">
+          <p:childTnLst>
+            <p:seq concurrent="1" nextAc="seek">
+              <p:cTn id="2" dur="indefinite" nodeType="mainSeq">
+                <p:childTnLst>
+                  <p:par>
+                    <p:cTn id="3" fill="hold">
+                      <p:stCondLst>
+                        <p:cond delay="indefinite"/>
+                      </p:stCondLst>
+                      <p:childTnLst>
+                        <p:par>
+                          <p:cTn id="4" fill="hold">
+                            <p:stCondLst>
+                              <p:cond delay="0"/>
+                            </p:stCondLst>
+                            <p:childTnLst>
+                              <p:par>
+                                <p:cTn id="5" presetID="2" presetClass="exit" presetSubtype="4" fill="hold" nodeType="clickEffect">
+                                  <p:stCondLst>
+                                    <p:cond delay="0"/>
+                                  </p:stCondLst>
+                                  <p:childTnLst>
+                                    <p:anim calcmode="lin" valueType="num">
+                                      <p:cBhvr additive="base">
+                                        <p:cTn id="6" dur="1000"/>
+                                        <p:tgtEl>
+                                          <p:spTgt spid="4"/>
+                                        </p:tgtEl>
+                                        <p:attrNameLst>
+                                          <p:attrName>ppt_x</p:attrName>
+                                        </p:attrNameLst>
+                                      </p:cBhvr>
+                                      <p:tavLst>
+                                        <p:tav tm="0">
+                                          <p:val>
+                                            <p:strVal val="ppt_x"/>
+                                          </p:val>
+                                        </p:tav>
+                                        <p:tav tm="100000">
+                                          <p:val>
+                                            <p:strVal val="ppt_x"/>
+                                          </p:val>
+                                        </p:tav>
+                                      </p:tavLst>
+                                    </p:anim>
+                                    <p:anim calcmode="lin" valueType="num">
+                                      <p:cBhvr additive="base">
+                                        <p:cTn id="7" dur="1000"/>
+                                        <p:tgtEl>
+                                          <p:spTgt spid="4"/>
+                                        </p:tgtEl>
+                                        <p:attrNameLst>
+                                          <p:attrName>ppt_y</p:attrName>
+                                        </p:attrNameLst>
+                                      </p:cBhvr>
+                                      <p:tavLst>
+                                        <p:tav tm="0">
+                                          <p:val>
+                                            <p:strVal val="ppt_y"/>
+                                          </p:val>
+                                        </p:tav>
+                                        <p:tav tm="100000">
+                                          <p:val>
+                                            <p:strVal val="1+ppt_h/2"/>
+                                          </p:val>
+                                        </p:tav>
+                                      </p:tavLst>
+                                    </p:anim>
+                                    <p:set>
+                                      <p:cBhvr>
+                                        <p:cTn id="8" dur="1" fill="hold">
+                                          <p:stCondLst>
+                                            <p:cond delay="998"/>
+                                          </p:stCondLst>
+                                        </p:cTn>
+                                        <p:tgtEl>
+                                          <p:spTgt spid="4"/>
+                                        </p:tgtEl>
+                                        <p:attrNameLst>
+                                          <p:attrName>style.visibility</p:attrName>
+                                        </p:attrNameLst>
+                                      </p:cBhvr>
+                                      <p:to>
+                                        <p:strVal val="hidden"/>
+                                      </p:to>
+                                    </p:set>
+                                  </p:childTnLst>
+                                </p:cTn>
+                              </p:par>
+                              <p:par>
+                                <p:cTn id="9" presetID="2" presetClass="entr" presetSubtype="1" fill="hold" nodeType="withEffect">
+                                  <p:stCondLst>
+                                    <p:cond delay="0"/>
+                                  </p:stCondLst>
+                                  <p:childTnLst>
+                                    <p:set>
+                                      <p:cBhvr>
+                                        <p:cTn id="10" dur="1000" fill="hold">
+                                          <p:stCondLst>
+                                            <p:cond delay="0"/>
+                                          </p:stCondLst>
+                                        </p:cTn>
+                                        <p:tgtEl>
+                                          <p:spTgt spid="20"/>
+                                        </p:tgtEl>
+                                        <p:attrNameLst>
+                                          <p:attrName>style.visibility</p:attrName>
+                                        </p:attrNameLst>
+                                      </p:cBhvr>
+                                      <p:to>
+                                        <p:strVal val="visible"/>
+                                      </p:to>
+                                    </p:set>
+                                    <p:anim calcmode="lin" valueType="num">
+                                      <p:cBhvr additive="base">
+                                        <p:cTn id="11" dur="1000" fill="hold"/>
+                                        <p:tgtEl>
+                                          <p:spTgt spid="20"/>
+                                        </p:tgtEl>
+                                        <p:attrNameLst>
+                                          <p:attrName>ppt_x</p:attrName>
+                                        </p:attrNameLst>
+                                      </p:cBhvr>
+                                      <p:tavLst>
+                                        <p:tav tm="0">
+                                          <p:val>
+                                            <p:strVal val="#ppt_x"/>
+                                          </p:val>
+                                        </p:tav>
+                                        <p:tav tm="100000">
+                                          <p:val>
+                                            <p:strVal val="#ppt_x"/>
+                                          </p:val>
+                                        </p:tav>
+                                      </p:tavLst>
+                                    </p:anim>
+                                    <p:anim calcmode="lin" valueType="num">
+                                      <p:cBhvr additive="base">
+                                        <p:cTn id="12" dur="1000" fill="hold"/>
+                                        <p:tgtEl>
+                                          <p:spTgt spid="20"/>
+                                        </p:tgtEl>
+                                        <p:attrNameLst>
+                                          <p:attrName>ppt_y</p:attrName>
+                                        </p:attrNameLst>
+                                      </p:cBhvr>
+                                      <p:tavLst>
+                                        <p:tav tm="0">
+                                          <p:val>
+                                            <p:strVal val="0-#ppt_h/2"/>
+                                          </p:val>
+                                        </p:tav>
+                                        <p:tav tm="100000">
+                                          <p:val>
+                                            <p:strVal val="#ppt_y"/>
+                                          </p:val>
+                                        </p:tav>
+                                      </p:tavLst>
+                                    </p:anim>
+                                  </p:childTnLst>
+                                </p:cTn>
+                              </p:par>
+                            </p:childTnLst>
+                          </p:cTn>
+                        </p:par>
+                      </p:childTnLst>
+                    </p:cTn>
+                  </p:par>
+                </p:childTnLst>
+              </p:cTn>
+              <p:prevCondLst>
+                <p:cond evt="onPrev" delay="0">
+                  <p:tgtEl>
+                    <p:sldTgt/>
+                  </p:tgtEl>
+                </p:cond>
+              </p:prevCondLst>
+              <p:nextCondLst>
+                <p:cond evt="onNext" delay="0">
+                  <p:tgtEl>
+                    <p:sldTgt/>
+                  </p:tgtEl>
+                </p:cond>
+              </p:nextCondLst>
+            </p:seq>
+          </p:childTnLst>
+        </p:cTn>
+      </p:par>
+    </p:tnLst>
+  </p:timing>
+</p:sld>
+</file>
+
+<file path=ppt/slides/slide2.xml><?xml version="1.0" encoding="utf-8"?>
+<p:sld xmlns:a="http://schemas.openxmlformats.org/drawingml/2006/main" xmlns:r="http://schemas.openxmlformats.org/officeDocument/2006/relationships" xmlns:p="http://schemas.openxmlformats.org/presentationml/2006/main">
+  <p:cSld>
+    <p:spTree>
+      <p:nvGrpSpPr>
+        <p:cNvPr id="1" name=""/>
+        <p:cNvGrpSpPr/>
+        <p:nvPr/>
+      </p:nvGrpSpPr>
+      <p:grpSpPr/>
+      <p:grpSp>
+        <p:nvGrpSpPr>
+          <p:cNvPr id="5" name="组合 4"/>
+          <p:cNvGrpSpPr/>
+          <p:nvPr/>
+        </p:nvGrpSpPr>
+        <p:grpSpPr>
+          <a:xfrm>
+            <a:off x="635000" y="2194560"/>
+            <a:ext cx="6734175" cy="1090295"/>
+            <a:chOff x="1000" y="1038"/>
+            <a:chExt cx="10605" cy="1717"/>
+          </a:xfrm>
+        </p:grpSpPr>
+        <p:sp>
+          <p:nvSpPr>
+            <p:cNvPr id="3" name="菱形 2"/>
+            <p:cNvSpPr/>
+            <p:nvPr/>
+          </p:nvSpPr>
+          <p:spPr>
+            <a:xfrm>
+              <a:off x="1000" y="1038"/>
+              <a:ext cx="1717" cy="1717"/>
+            </a:xfrm>
+            <a:prstGeom prst="diamond">
+              <a:avLst/>
+            </a:prstGeom>
+            <a:solidFill>
+              <a:schemeClr val="bg1">
+                <a:lumMod val="65000"/>
+              </a:schemeClr>
+            </a:solidFill>
+            <a:ln>
+              <a:noFill/>
+            </a:ln>
+          </p:spPr>
+          <p:style>
+            <a:lnRef idx="2">
+              <a:schemeClr val="accent1">
+                <a:shade val="50000"/>
+              </a:schemeClr>
+            </a:lnRef>
+            <a:fillRef idx="1">
+              <a:schemeClr val="accent1"/>
+            </a:fillRef>
+            <a:effectRef idx="0">
+              <a:schemeClr val="accent1"/>
+            </a:effectRef>
+            <a:fontRef idx="minor">
+              <a:schemeClr val="lt1"/>
+            </a:fontRef>
+          </p:style>
+          <p:txBody>
+            <a:bodyPr rtlCol="0" anchor="ctr"/>
+            <a:p>
+              <a:pPr algn="ctr"/>
+              <a:endParaRPr lang="zh-CN" altLang="en-US"/>
+            </a:p>
+          </p:txBody>
+        </p:sp>
+        <p:sp>
+          <p:nvSpPr>
+            <p:cNvPr id="4" name="文本框 3"/>
+            <p:cNvSpPr txBox="1"/>
+            <p:nvPr/>
+          </p:nvSpPr>
+          <p:spPr>
+            <a:xfrm>
+              <a:off x="1471" y="1243"/>
+              <a:ext cx="10134" cy="1307"/>
+            </a:xfrm>
+            <a:prstGeom prst="rect">
+              <a:avLst/>
+            </a:prstGeom>
+            <a:noFill/>
+          </p:spPr>
+          <p:txBody>
+            <a:bodyPr wrap="none" rtlCol="0">
+              <a:spAutoFit/>
+            </a:bodyPr>
+            <a:p>
+              <a:pPr algn="l"/>
+              <a:r>
+                <a:rPr lang="en-US" altLang="zh-CN" sz="4800">
+                  <a:solidFill>
+                    <a:schemeClr val="bg1"/>
+                  </a:solidFill>
+                </a:rPr>
+                <a:t>1</a:t>
+              </a:r>
+              <a:r>
+                <a:rPr lang="en-US" altLang="zh-CN" sz="4800"/>
+                <a:t>    </a:t>
+              </a:r>
+              <a:r>
+                <a:rPr lang="en-US" altLang="zh-CN" sz="4800" b="1">
+                  <a:solidFill>
+                    <a:srgbClr val="2F2F2F"/>
+                  </a:solidFill>
+                </a:rPr>
+                <a:t>The basis of the book</a:t>
+              </a:r>
+              <a:endParaRPr lang="en-US" altLang="zh-CN" sz="4800" b="1">
+                <a:solidFill>
+                  <a:srgbClr val="2F2F2F"/>
+                </a:solidFill>
+              </a:endParaRPr>
+            </a:p>
+          </p:txBody>
+        </p:sp>
+      </p:grpSp>
+      <p:grpSp>
+        <p:nvGrpSpPr>
+          <p:cNvPr id="6" name="组合 5"/>
+          <p:cNvGrpSpPr/>
+          <p:nvPr/>
+        </p:nvGrpSpPr>
+        <p:grpSpPr>
+          <a:xfrm>
+            <a:off x="635000" y="3598545"/>
+            <a:ext cx="10551795" cy="1090295"/>
+            <a:chOff x="1000" y="1038"/>
+            <a:chExt cx="16617" cy="1717"/>
+          </a:xfrm>
+        </p:grpSpPr>
+        <p:sp>
+          <p:nvSpPr>
+            <p:cNvPr id="7" name="菱形 6"/>
+            <p:cNvSpPr/>
+            <p:nvPr/>
+          </p:nvSpPr>
+          <p:spPr>
+            <a:xfrm>
+              <a:off x="1000" y="1038"/>
+              <a:ext cx="1717" cy="1717"/>
+            </a:xfrm>
+            <a:prstGeom prst="diamond">
+              <a:avLst/>
+            </a:prstGeom>
+            <a:solidFill>
+              <a:schemeClr val="bg1">
+                <a:lumMod val="65000"/>
+              </a:schemeClr>
+            </a:solidFill>
+            <a:ln>
+              <a:noFill/>
+            </a:ln>
+          </p:spPr>
+          <p:style>
+            <a:lnRef idx="2">
+              <a:schemeClr val="accent1">
+                <a:shade val="50000"/>
+              </a:schemeClr>
+            </a:lnRef>
+            <a:fillRef idx="1">
+              <a:schemeClr val="accent1"/>
+            </a:fillRef>
+            <a:effectRef idx="0">
+              <a:schemeClr val="accent1"/>
+            </a:effectRef>
+            <a:fontRef idx="minor">
+              <a:schemeClr val="lt1"/>
+            </a:fontRef>
+          </p:style>
+          <p:txBody>
+            <a:bodyPr rtlCol="0" anchor="ctr"/>
+            <a:p>
+              <a:pPr algn="ctr"/>
+              <a:endParaRPr lang="zh-CN" altLang="en-US"/>
+            </a:p>
+          </p:txBody>
+        </p:sp>
+        <p:sp>
+          <p:nvSpPr>
+            <p:cNvPr id="8" name="文本框 7"/>
+            <p:cNvSpPr txBox="1"/>
+            <p:nvPr/>
+          </p:nvSpPr>
+          <p:spPr>
+            <a:xfrm>
+              <a:off x="1471" y="1243"/>
+              <a:ext cx="16146" cy="1307"/>
+            </a:xfrm>
+            <a:prstGeom prst="rect">
+              <a:avLst/>
+            </a:prstGeom>
+            <a:noFill/>
+          </p:spPr>
+          <p:txBody>
+            <a:bodyPr wrap="none" rtlCol="0">
+              <a:spAutoFit/>
+            </a:bodyPr>
+            <a:p>
+              <a:pPr algn="l"/>
+              <a:r>
+                <a:rPr lang="en-US" altLang="zh-CN" sz="4800">
+                  <a:solidFill>
+                    <a:schemeClr val="bg1"/>
+                  </a:solidFill>
+                </a:rPr>
+                <a:t>2</a:t>
+              </a:r>
+              <a:r>
+                <a:rPr lang="en-US" altLang="zh-CN" sz="4800"/>
+                <a:t>    </a:t>
+              </a:r>
+              <a:r>
+                <a:rPr lang="en-US" altLang="zh-CN" sz="4800" b="1">
+                  <a:solidFill>
+                    <a:srgbClr val="2F2F2F"/>
+                  </a:solidFill>
+                </a:rPr>
+                <a:t>The interesting plots about the book</a:t>
+              </a:r>
+              <a:endParaRPr lang="en-US" altLang="zh-CN" sz="4800" b="1">
+                <a:solidFill>
+                  <a:srgbClr val="2F2F2F"/>
+                </a:solidFill>
+              </a:endParaRPr>
+            </a:p>
+          </p:txBody>
+        </p:sp>
+      </p:grpSp>
+      <p:grpSp>
+        <p:nvGrpSpPr>
+          <p:cNvPr id="10" name="组合 9"/>
+          <p:cNvGrpSpPr/>
+          <p:nvPr/>
+        </p:nvGrpSpPr>
+        <p:grpSpPr>
+          <a:xfrm>
+            <a:off x="635000" y="5001895"/>
+            <a:ext cx="7808595" cy="1090295"/>
+            <a:chOff x="1000" y="1038"/>
+            <a:chExt cx="12297" cy="1717"/>
+          </a:xfrm>
+        </p:grpSpPr>
+        <p:sp>
+          <p:nvSpPr>
+            <p:cNvPr id="11" name="菱形 10"/>
+            <p:cNvSpPr/>
+            <p:nvPr/>
+          </p:nvSpPr>
+          <p:spPr>
+            <a:xfrm>
+              <a:off x="1000" y="1038"/>
+              <a:ext cx="1717" cy="1717"/>
+            </a:xfrm>
+            <a:prstGeom prst="diamond">
+              <a:avLst/>
+            </a:prstGeom>
+            <a:solidFill>
+              <a:schemeClr val="bg1">
+                <a:lumMod val="65000"/>
+              </a:schemeClr>
+            </a:solidFill>
+            <a:ln>
+              <a:noFill/>
+            </a:ln>
+          </p:spPr>
+          <p:style>
+            <a:lnRef idx="2">
+              <a:schemeClr val="accent1">
+                <a:shade val="50000"/>
+              </a:schemeClr>
+            </a:lnRef>
+            <a:fillRef idx="1">
+              <a:schemeClr val="accent1"/>
+            </a:fillRef>
+            <a:effectRef idx="0">
+              <a:schemeClr val="accent1"/>
+            </a:effectRef>
+            <a:fontRef idx="minor">
+              <a:schemeClr val="lt1"/>
+            </a:fontRef>
+          </p:style>
+          <p:txBody>
+            <a:bodyPr rtlCol="0" anchor="ctr"/>
+            <a:p>
+              <a:pPr algn="ctr"/>
+              <a:endParaRPr lang="zh-CN" altLang="en-US"/>
+            </a:p>
+          </p:txBody>
+        </p:sp>
+        <p:sp>
+          <p:nvSpPr>
+            <p:cNvPr id="12" name="文本框 11"/>
+            <p:cNvSpPr txBox="1"/>
+            <p:nvPr/>
+          </p:nvSpPr>
+          <p:spPr>
+            <a:xfrm>
+              <a:off x="1471" y="1243"/>
+              <a:ext cx="11826" cy="1307"/>
+            </a:xfrm>
+            <a:prstGeom prst="rect">
+              <a:avLst/>
+            </a:prstGeom>
+            <a:noFill/>
+          </p:spPr>
+          <p:txBody>
+            <a:bodyPr wrap="none" rtlCol="0">
+              <a:spAutoFit/>
+            </a:bodyPr>
+            <a:p>
+              <a:pPr algn="l"/>
+              <a:r>
+                <a:rPr lang="en-US" altLang="zh-CN" sz="4800">
+                  <a:solidFill>
+                    <a:schemeClr val="bg1"/>
+                  </a:solidFill>
+                </a:rPr>
+                <a:t>3</a:t>
+              </a:r>
+              <a:r>
+                <a:rPr lang="en-US" altLang="zh-CN" sz="4800"/>
+                <a:t>    </a:t>
+              </a:r>
+              <a:r>
+                <a:rPr lang="en-US" altLang="zh-CN" sz="4800" b="1">
+                  <a:solidFill>
+                    <a:srgbClr val="2F2F2F"/>
+                  </a:solidFill>
+                </a:rPr>
+                <a:t>The influence of the book</a:t>
+              </a:r>
+              <a:endParaRPr lang="en-US" altLang="zh-CN" sz="4800" b="1">
+                <a:solidFill>
+                  <a:srgbClr val="2F2F2F"/>
+                </a:solidFill>
+              </a:endParaRPr>
+            </a:p>
+          </p:txBody>
+        </p:sp>
+      </p:grpSp>
+      <p:sp>
+        <p:nvSpPr>
+          <p:cNvPr id="13" name="文本框 12"/>
+          <p:cNvSpPr txBox="1"/>
+          <p:nvPr/>
+        </p:nvSpPr>
+        <p:spPr>
+          <a:xfrm>
+            <a:off x="2214880" y="256540"/>
+            <a:ext cx="7762875" cy="1938020"/>
+          </a:xfrm>
+          <a:prstGeom prst="rect">
+            <a:avLst/>
+          </a:prstGeom>
+          <a:noFill/>
+        </p:spPr>
+        <p:txBody>
+          <a:bodyPr wrap="square" rtlCol="0">
+            <a:spAutoFit/>
+          </a:bodyPr>
+          <a:p>
+            <a:pPr algn="ctr"/>
+            <a:r>
+              <a:rPr lang="en-US" altLang="zh-CN" sz="12000" b="1">
+                <a:solidFill>
+                  <a:srgbClr val="303030"/>
+                </a:solidFill>
+              </a:rPr>
+              <a:t>OUTLINE</a:t>
+            </a:r>
+            <a:endParaRPr lang="en-US" altLang="zh-CN" sz="12000" b="1">
+              <a:solidFill>
+                <a:srgbClr val="303030"/>
+              </a:solidFill>
+            </a:endParaRPr>
+          </a:p>
+        </p:txBody>
+      </p:sp>
+      <p:pic>
+        <p:nvPicPr>
+          <p:cNvPr id="14" name="图片 13" descr="book2"/>
+          <p:cNvPicPr>
+            <a:picLocks noChangeAspect="1"/>
+          </p:cNvPicPr>
+          <p:nvPr>
+            <p:custDataLst>
+              <p:tags r:id="rId1"/>
+            </p:custDataLst>
+          </p:nvPr>
+        </p:nvPicPr>
+        <p:blipFill>
+          <a:blip r:embed="rId2"/>
+          <a:stretch>
+            <a:fillRect/>
+          </a:stretch>
+        </p:blipFill>
+        <p:spPr>
+          <a:xfrm>
+            <a:off x="8933180" y="4566285"/>
+            <a:ext cx="3170555" cy="2078990"/>
+          </a:xfrm>
+          <a:prstGeom prst="rect">
+            <a:avLst/>
+          </a:prstGeom>
+        </p:spPr>
+      </p:pic>
     </p:spTree>
   </p:cSld>
   <p:clrMapOvr>
     <a:masterClrMapping/>
   </p:clrMapOvr>
 </p:sld>
+</file>
+
+<file path=ppt/slides/slide3.xml><?xml version="1.0" encoding="utf-8"?>
+<p:sld xmlns:a="http://schemas.openxmlformats.org/drawingml/2006/main" xmlns:r="http://schemas.openxmlformats.org/officeDocument/2006/relationships" xmlns:p="http://schemas.openxmlformats.org/presentationml/2006/main">
+  <p:cSld>
+    <p:spTree>
+      <p:nvGrpSpPr>
+        <p:cNvPr id="1" name=""/>
+        <p:cNvGrpSpPr/>
+        <p:nvPr/>
+      </p:nvGrpSpPr>
+      <p:grpSpPr/>
+      <p:pic>
+        <p:nvPicPr>
+          <p:cNvPr id="4" name="图片 3" descr="threebody"/>
+          <p:cNvPicPr>
+            <a:picLocks noChangeAspect="1"/>
+          </p:cNvPicPr>
+          <p:nvPr>
+            <p:custDataLst>
+              <p:tags r:id="rId1"/>
+            </p:custDataLst>
+          </p:nvPr>
+        </p:nvPicPr>
+        <p:blipFill>
+          <a:blip r:embed="rId2"/>
+          <a:stretch>
+            <a:fillRect/>
+          </a:stretch>
+        </p:blipFill>
+        <p:spPr>
+          <a:xfrm>
+            <a:off x="-27305" y="-90805"/>
+            <a:ext cx="12407265" cy="6948170"/>
+          </a:xfrm>
+          <a:prstGeom prst="rect">
+            <a:avLst/>
+          </a:prstGeom>
+        </p:spPr>
+      </p:pic>
+    </p:spTree>
+    <p:custDataLst>
+      <p:tags r:id="rId3"/>
+    </p:custDataLst>
+  </p:cSld>
+  <p:clrMapOvr>
+    <a:masterClrMapping/>
+  </p:clrMapOvr>
+</p:sld>
+</file>
+
+<file path=ppt/slides/slide4.xml><?xml version="1.0" encoding="utf-8"?>
+<p:sld xmlns:a="http://schemas.openxmlformats.org/drawingml/2006/main" xmlns:r="http://schemas.openxmlformats.org/officeDocument/2006/relationships" xmlns:p="http://schemas.openxmlformats.org/presentationml/2006/main">
+  <p:cSld>
+    <p:bg>
+      <p:bgPr>
+        <a:blipFill>
+          <a:blip r:embed="rId1"/>
+          <a:stretch>
+            <a:fillRect/>
+          </a:stretch>
+        </a:blipFill>
+        <a:effectLst/>
+      </p:bgPr>
+    </p:bg>
+    <p:spTree>
+      <p:nvGrpSpPr>
+        <p:cNvPr id="1" name=""/>
+        <p:cNvGrpSpPr/>
+        <p:nvPr/>
+      </p:nvGrpSpPr>
+      <p:grpSpPr/>
+      <p:pic>
+        <p:nvPicPr>
+          <p:cNvPr id="2" name="图片 1" descr="threebodyproblem"/>
+          <p:cNvPicPr>
+            <a:picLocks noChangeAspect="1"/>
+          </p:cNvPicPr>
+          <p:nvPr>
+            <p:custDataLst>
+              <p:tags r:id="rId2"/>
+            </p:custDataLst>
+          </p:nvPr>
+        </p:nvPicPr>
+        <p:blipFill>
+          <a:blip r:embed="rId3"/>
+          <a:stretch>
+            <a:fillRect/>
+          </a:stretch>
+        </p:blipFill>
+        <p:spPr>
+          <a:xfrm>
+            <a:off x="7641590" y="134620"/>
+            <a:ext cx="4361180" cy="6588125"/>
+          </a:xfrm>
+          <a:prstGeom prst="rect">
+            <a:avLst/>
+          </a:prstGeom>
+          <a:effectLst>
+            <a:outerShdw blurRad="431800" dist="50800" dir="5400000" sx="101000" sy="101000" algn="t" rotWithShape="0">
+              <a:prstClr val="black">
+                <a:alpha val="100000"/>
+              </a:prstClr>
+            </a:outerShdw>
+          </a:effectLst>
+        </p:spPr>
+      </p:pic>
+      <p:grpSp>
+        <p:nvGrpSpPr>
+          <p:cNvPr id="12" name="组合 11"/>
+          <p:cNvGrpSpPr/>
+          <p:nvPr/>
+        </p:nvGrpSpPr>
+        <p:grpSpPr>
+          <a:xfrm>
+            <a:off x="336550" y="0"/>
+            <a:ext cx="6931660" cy="5373370"/>
+            <a:chOff x="885" y="212"/>
+            <a:chExt cx="10916" cy="8462"/>
+          </a:xfrm>
+        </p:grpSpPr>
+        <p:grpSp>
+          <p:nvGrpSpPr>
+            <p:cNvPr id="15" name="组合 14"/>
+            <p:cNvGrpSpPr/>
+            <p:nvPr/>
+          </p:nvGrpSpPr>
+          <p:grpSpPr>
+            <a:xfrm>
+              <a:off x="885" y="212"/>
+              <a:ext cx="10916" cy="7625"/>
+              <a:chOff x="1245" y="572"/>
+              <a:chExt cx="9782" cy="9298"/>
+            </a:xfrm>
+          </p:grpSpPr>
+          <p:sp>
+            <p:nvSpPr>
+              <p:cNvPr id="8" name="文本框 7"/>
+              <p:cNvSpPr txBox="1"/>
+              <p:nvPr/>
+            </p:nvSpPr>
+            <p:spPr>
+              <a:xfrm>
+                <a:off x="1245" y="2603"/>
+                <a:ext cx="9782" cy="7267"/>
+              </a:xfrm>
+              <a:prstGeom prst="rect">
+                <a:avLst/>
+              </a:prstGeom>
+              <a:noFill/>
+            </p:spPr>
+            <p:txBody>
+              <a:bodyPr wrap="square" rtlCol="0">
+                <a:spAutoFit/>
+              </a:bodyPr>
+              <a:p>
+                <a:pPr algn="l" fontAlgn="auto">
+                  <a:lnSpc>
+                    <a:spcPct val="80000"/>
+                  </a:lnSpc>
+                </a:pPr>
+                <a:r>
+                  <a:rPr lang="en-US" altLang="zh-CN" sz="12000" b="1">
+                    <a:solidFill>
+                      <a:srgbClr val="E4E4E4"/>
+                    </a:solidFill>
+                  </a:rPr>
+                  <a:t>THREE</a:t>
+                </a:r>
+                <a:endParaRPr lang="en-US" altLang="zh-CN" sz="12000" b="1">
+                  <a:solidFill>
+                    <a:srgbClr val="E4E4E4"/>
+                  </a:solidFill>
+                </a:endParaRPr>
+              </a:p>
+              <a:p>
+                <a:pPr algn="l" fontAlgn="auto">
+                  <a:lnSpc>
+                    <a:spcPct val="80000"/>
+                  </a:lnSpc>
+                </a:pPr>
+                <a:r>
+                  <a:rPr lang="en-US" altLang="zh-CN" sz="12000" b="1">
+                    <a:solidFill>
+                      <a:srgbClr val="E4E4E4"/>
+                    </a:solidFill>
+                  </a:rPr>
+                  <a:t>BODY </a:t>
+                </a:r>
+                <a:endParaRPr lang="en-US" altLang="zh-CN" sz="16000" b="1">
+                  <a:solidFill>
+                    <a:srgbClr val="E4E4E4"/>
+                  </a:solidFill>
+                </a:endParaRPr>
+              </a:p>
+              <a:p>
+                <a:pPr algn="l"/>
+                <a:endParaRPr lang="en-US" altLang="zh-CN" sz="4800" b="1">
+                  <a:solidFill>
+                    <a:srgbClr val="E4E4E4"/>
+                  </a:solidFill>
+                </a:endParaRPr>
+              </a:p>
+            </p:txBody>
+          </p:sp>
+          <p:sp>
+            <p:nvSpPr>
+              <p:cNvPr id="9" name="文本框 8"/>
+              <p:cNvSpPr txBox="1"/>
+              <p:nvPr/>
+            </p:nvSpPr>
+            <p:spPr>
+              <a:xfrm>
+                <a:off x="1245" y="572"/>
+                <a:ext cx="5618" cy="2539"/>
+              </a:xfrm>
+              <a:prstGeom prst="rect">
+                <a:avLst/>
+              </a:prstGeom>
+              <a:noFill/>
+            </p:spPr>
+            <p:txBody>
+              <a:bodyPr wrap="square" rtlCol="0">
+                <a:spAutoFit/>
+              </a:bodyPr>
+              <a:p>
+                <a:pPr algn="l"/>
+                <a:r>
+                  <a:rPr lang="en-US" altLang="zh-CN" sz="8000">
+                    <a:solidFill>
+                      <a:srgbClr val="2F2F2F"/>
+                    </a:solidFill>
+                  </a:rPr>
+                  <a:t>THE</a:t>
+                </a:r>
+                <a:endParaRPr lang="en-US" altLang="zh-CN" sz="8000">
+                  <a:solidFill>
+                    <a:srgbClr val="2F2F2F"/>
+                  </a:solidFill>
+                </a:endParaRPr>
+              </a:p>
+            </p:txBody>
+          </p:sp>
+        </p:grpSp>
+        <p:sp>
+          <p:nvSpPr>
+            <p:cNvPr id="11" name="文本框 10"/>
+            <p:cNvSpPr txBox="1"/>
+            <p:nvPr/>
+          </p:nvSpPr>
+          <p:spPr>
+            <a:xfrm>
+              <a:off x="885" y="6592"/>
+              <a:ext cx="9428" cy="2082"/>
+            </a:xfrm>
+            <a:prstGeom prst="rect">
+              <a:avLst/>
+            </a:prstGeom>
+            <a:noFill/>
+          </p:spPr>
+          <p:txBody>
+            <a:bodyPr wrap="square" rtlCol="0">
+              <a:spAutoFit/>
+            </a:bodyPr>
+            <a:p>
+              <a:pPr algn="l"/>
+              <a:r>
+                <a:rPr lang="en-US" altLang="zh-CN" sz="8000">
+                  <a:solidFill>
+                    <a:srgbClr val="787878"/>
+                  </a:solidFill>
+                </a:rPr>
+                <a:t>PROBLEM</a:t>
+              </a:r>
+              <a:endParaRPr lang="en-US" altLang="zh-CN" sz="8000">
+                <a:solidFill>
+                  <a:srgbClr val="787878"/>
+                </a:solidFill>
+              </a:endParaRPr>
+            </a:p>
+          </p:txBody>
+        </p:sp>
+      </p:grpSp>
+    </p:spTree>
+  </p:cSld>
+  <p:clrMapOvr>
+    <a:masterClrMapping/>
+  </p:clrMapOvr>
+</p:sld>
+</file>
+
+<file path=ppt/slides/slide5.xml><?xml version="1.0" encoding="utf-8"?>
+<p:sld xmlns:a="http://schemas.openxmlformats.org/drawingml/2006/main" xmlns:r="http://schemas.openxmlformats.org/officeDocument/2006/relationships" xmlns:p="http://schemas.openxmlformats.org/presentationml/2006/main">
+  <p:cSld>
+    <p:spTree>
+      <p:nvGrpSpPr>
+        <p:cNvPr id="1" name=""/>
+        <p:cNvGrpSpPr/>
+        <p:nvPr/>
+      </p:nvGrpSpPr>
+      <p:grpSpPr/>
+      <p:pic>
+        <p:nvPicPr>
+          <p:cNvPr id="18" name="图片 17" descr="question"/>
+          <p:cNvPicPr>
+            <a:picLocks noChangeAspect="1"/>
+          </p:cNvPicPr>
+          <p:nvPr/>
+        </p:nvPicPr>
+        <p:blipFill>
+          <a:blip r:embed="rId1"/>
+          <a:stretch>
+            <a:fillRect/>
+          </a:stretch>
+        </p:blipFill>
+        <p:spPr>
+          <a:xfrm>
+            <a:off x="1497965" y="1663700"/>
+            <a:ext cx="5043170" cy="5043170"/>
+          </a:xfrm>
+          <a:prstGeom prst="rect">
+            <a:avLst/>
+          </a:prstGeom>
+        </p:spPr>
+      </p:pic>
+      <p:sp>
+        <p:nvSpPr>
+          <p:cNvPr id="2" name="文本框 1"/>
+          <p:cNvSpPr txBox="1"/>
+          <p:nvPr/>
+        </p:nvSpPr>
+        <p:spPr>
+          <a:xfrm>
+            <a:off x="792480" y="134620"/>
+            <a:ext cx="10606405" cy="1715770"/>
+          </a:xfrm>
+          <a:prstGeom prst="rect">
+            <a:avLst/>
+          </a:prstGeom>
+          <a:noFill/>
+        </p:spPr>
+        <p:txBody>
+          <a:bodyPr wrap="none" rtlCol="0" anchor="t">
+            <a:spAutoFit/>
+          </a:bodyPr>
+          <a:p>
+            <a:pPr algn="l" fontAlgn="auto">
+              <a:lnSpc>
+                <a:spcPct val="80000"/>
+              </a:lnSpc>
+            </a:pPr>
+            <a:r>
+              <a:rPr lang="en-US" altLang="zh-CN" sz="6000" b="1"/>
+              <a:t>Have you read the science fiction</a:t>
+            </a:r>
+            <a:endParaRPr lang="en-US" altLang="zh-CN" sz="6000" b="1"/>
+          </a:p>
+          <a:p>
+            <a:pPr algn="ctr" fontAlgn="auto">
+              <a:lnSpc>
+                <a:spcPct val="80000"/>
+              </a:lnSpc>
+            </a:pPr>
+            <a:r>
+              <a:rPr lang="en-US" altLang="zh-CN" sz="6000" b="1" i="1"/>
+              <a:t>The Three Body Problem</a:t>
+            </a:r>
+            <a:r>
+              <a:rPr lang="en-US" altLang="zh-CN" sz="6000" b="1"/>
+              <a:t>?</a:t>
+            </a:r>
+            <a:r>
+              <a:rPr lang="en-US" altLang="zh-CN" sz="7200"/>
+              <a:t> </a:t>
+            </a:r>
+            <a:endParaRPr lang="en-US" altLang="zh-CN" sz="7200"/>
+          </a:p>
+        </p:txBody>
+      </p:sp>
+      <p:pic>
+        <p:nvPicPr>
+          <p:cNvPr id="3" name="图片 2" descr="santi"/>
+          <p:cNvPicPr>
+            <a:picLocks noChangeAspect="1"/>
+          </p:cNvPicPr>
+          <p:nvPr/>
+        </p:nvPicPr>
+        <p:blipFill>
+          <a:blip r:embed="rId2"/>
+          <a:stretch>
+            <a:fillRect/>
+          </a:stretch>
+        </p:blipFill>
+        <p:spPr>
+          <a:xfrm>
+            <a:off x="7000875" y="1788795"/>
+            <a:ext cx="3891915" cy="4792345"/>
+          </a:xfrm>
+          <a:prstGeom prst="rect">
+            <a:avLst/>
+          </a:prstGeom>
+          <a:effectLst/>
+        </p:spPr>
+      </p:pic>
+    </p:spTree>
+  </p:cSld>
+  <p:clrMapOvr>
+    <a:masterClrMapping/>
+  </p:clrMapOvr>
+</p:sld>
+</file>
+
+<file path=ppt/slides/slide6.xml><?xml version="1.0" encoding="utf-8"?>
+<p:sld xmlns:a="http://schemas.openxmlformats.org/drawingml/2006/main" xmlns:r="http://schemas.openxmlformats.org/officeDocument/2006/relationships" xmlns:p="http://schemas.openxmlformats.org/presentationml/2006/main">
+  <p:cSld>
+    <p:spTree>
+      <p:nvGrpSpPr>
+        <p:cNvPr id="1" name=""/>
+        <p:cNvGrpSpPr/>
+        <p:nvPr/>
+      </p:nvGrpSpPr>
+      <p:grpSpPr/>
+    </p:spTree>
+  </p:cSld>
+  <p:clrMapOvr>
+    <a:masterClrMapping/>
+  </p:clrMapOvr>
+</p:sld>
+</file>
+
+<file path=ppt/tags/tag1.xml><?xml version="1.0" encoding="utf-8"?>
+<p:tagLst xmlns:p="http://schemas.openxmlformats.org/presentationml/2006/main">
+  <p:tag name="KSO_WM_FULL_TEXT_BEAUTIFY_COPY_ID" val="7"/>
+</p:tagLst>
+</file>
+
+<file path=ppt/tags/tag2.xml><?xml version="1.0" encoding="utf-8"?>
+<p:tagLst xmlns:p="http://schemas.openxmlformats.org/presentationml/2006/main">
+  <p:tag name="KSO_WM_FULL_TEXT_BEAUTIFY_COPY_ID" val="150995201"/>
+</p:tagLst>
+</file>
+
+<file path=ppt/tags/tag3.xml><?xml version="1.0" encoding="utf-8"?>
+<p:tagLst xmlns:p="http://schemas.openxmlformats.org/presentationml/2006/main">
+  <p:tag name="KSO_WM_FULL_TEXT_BEAUTIFY_COPY_ID" val="7"/>
+</p:tagLst>
+</file>
+
+<file path=ppt/tags/tag4.xml><?xml version="1.0" encoding="utf-8"?>
+<p:tagLst xmlns:p="http://schemas.openxmlformats.org/presentationml/2006/main">
+  <p:tag name="KSO_WM_FULL_TEXT_BEAUTIFY_COPY_ID" val="4"/>
+</p:tagLst>
+</file>
+
+<file path=ppt/tags/tag5.xml><?xml version="1.0" encoding="utf-8"?>
+<p:tagLst xmlns:p="http://schemas.openxmlformats.org/presentationml/2006/main">
+  <p:tag name="KSO_WM_FULL_TEXT_BEAUTIFY_COPY_ID" val="150995200"/>
+</p:tagLst>
+</file>
+
+<file path=ppt/tags/tag6.xml><?xml version="1.0" encoding="utf-8"?>
+<p:tagLst xmlns:p="http://schemas.openxmlformats.org/presentationml/2006/main">
+  <p:tag name="KSO_WM_UNIT_PLACING_PICTURE_USER_VIEWPORT" val="{&quot;height&quot;:15840,&quot;width&quot;:10487}"/>
+</p:tagLst>
 </file>
 
 <file path=ppt/theme/theme1.xml><?xml version="1.0" encoding="utf-8"?>
@@ -3215,4 +4986,263 @@
     </a:ext>
   </a:extLst>
 </a:theme>
+</file>
+
+<file path=ppt/theme/theme2.xml><?xml version="1.0" encoding="utf-8"?>
+<a:theme xmlns:a="http://schemas.openxmlformats.org/drawingml/2006/main" name="Office 主题">
+  <a:themeElements>
+    <a:clrScheme name="Office">
+      <a:dk1>
+        <a:sysClr val="windowText" lastClr="000000"/>
+      </a:dk1>
+      <a:lt1>
+        <a:sysClr val="window" lastClr="FFFFFF"/>
+      </a:lt1>
+      <a:dk2>
+        <a:srgbClr val="44546A"/>
+      </a:dk2>
+      <a:lt2>
+        <a:srgbClr val="E7E6E6"/>
+      </a:lt2>
+      <a:accent1>
+        <a:srgbClr val="5B9BD5"/>
+      </a:accent1>
+      <a:accent2>
+        <a:srgbClr val="ED7D31"/>
+      </a:accent2>
+      <a:accent3>
+        <a:srgbClr val="A5A5A5"/>
+      </a:accent3>
+      <a:accent4>
+        <a:srgbClr val="FFC000"/>
+      </a:accent4>
+      <a:accent5>
+        <a:srgbClr val="4472C4"/>
+      </a:accent5>
+      <a:accent6>
+        <a:srgbClr val="70AD47"/>
+      </a:accent6>
+      <a:hlink>
+        <a:srgbClr val="0563C1"/>
+      </a:hlink>
+      <a:folHlink>
+        <a:srgbClr val="954F72"/>
+      </a:folHlink>
+    </a:clrScheme>
+    <a:fontScheme name="Office">
+      <a:majorFont>
+        <a:latin typeface="Calibri Light"/>
+        <a:ea typeface=""/>
+        <a:cs typeface=""/>
+        <a:font script="Jpan" typeface="ＭＳ Ｐゴシック"/>
+        <a:font script="Hang" typeface="맑은 고딕"/>
+        <a:font script="Hans" typeface="宋体"/>
+        <a:font script="Hant" typeface="新細明體"/>
+        <a:font script="Arab" typeface="Times New Roman"/>
+        <a:font script="Hebr" typeface="Times New Roman"/>
+        <a:font script="Thai" typeface="Angsana New"/>
+        <a:font script="Ethi" typeface="Nyala"/>
+        <a:font script="Beng" typeface="Vrinda"/>
+        <a:font script="Gujr" typeface="Shruti"/>
+        <a:font script="Khmr" typeface="MoolBoran"/>
+        <a:font script="Knda" typeface="Tunga"/>
+        <a:font script="Guru" typeface="Raavi"/>
+        <a:font script="Cans" typeface="Euphemia"/>
+        <a:font script="Cher" typeface="Plantagenet Cherokee"/>
+        <a:font script="Yiii" typeface="Microsoft Yi Baiti"/>
+        <a:font script="Tibt" typeface="Microsoft Himalaya"/>
+        <a:font script="Thaa" typeface="MV Boli"/>
+        <a:font script="Deva" typeface="Mangal"/>
+        <a:font script="Telu" typeface="Gautami"/>
+        <a:font script="Taml" typeface="Latha"/>
+        <a:font script="Syrc" typeface="Estrangelo Edessa"/>
+        <a:font script="Orya" typeface="Kalinga"/>
+        <a:font script="Mlym" typeface="Kartika"/>
+        <a:font script="Laoo" typeface="DokChampa"/>
+        <a:font script="Sinh" typeface="Iskoola Pota"/>
+        <a:font script="Mong" typeface="Mongolian Baiti"/>
+        <a:font script="Viet" typeface="Times New Roman"/>
+        <a:font script="Uigh" typeface="Microsoft Uighur"/>
+        <a:font script="Geor" typeface="Sylfaen"/>
+      </a:majorFont>
+      <a:minorFont>
+        <a:latin typeface="Calibri"/>
+        <a:ea typeface=""/>
+        <a:cs typeface=""/>
+        <a:font script="Jpan" typeface="ＭＳ Ｐゴシック"/>
+        <a:font script="Hang" typeface="맑은 고딕"/>
+        <a:font script="Hans" typeface="宋体"/>
+        <a:font script="Hant" typeface="新細明體"/>
+        <a:font script="Arab" typeface="Arial"/>
+        <a:font script="Hebr" typeface="Arial"/>
+        <a:font script="Thai" typeface="Cordia New"/>
+        <a:font script="Ethi" typeface="Nyala"/>
+        <a:font script="Beng" typeface="Vrinda"/>
+        <a:font script="Gujr" typeface="Shruti"/>
+        <a:font script="Khmr" typeface="DaunPenh"/>
+        <a:font script="Knda" typeface="Tunga"/>
+        <a:font script="Guru" typeface="Raavi"/>
+        <a:font script="Cans" typeface="Euphemia"/>
+        <a:font script="Cher" typeface="Plantagenet Cherokee"/>
+        <a:font script="Yiii" typeface="Microsoft Yi Baiti"/>
+        <a:font script="Tibt" typeface="Microsoft Himalaya"/>
+        <a:font script="Thaa" typeface="MV Boli"/>
+        <a:font script="Deva" typeface="Mangal"/>
+        <a:font script="Telu" typeface="Gautami"/>
+        <a:font script="Taml" typeface="Latha"/>
+        <a:font script="Syrc" typeface="Estrangelo Edessa"/>
+        <a:font script="Orya" typeface="Kalinga"/>
+        <a:font script="Mlym" typeface="Kartika"/>
+        <a:font script="Laoo" typeface="DokChampa"/>
+        <a:font script="Sinh" typeface="Iskoola Pota"/>
+        <a:font script="Mong" typeface="Mongolian Baiti"/>
+        <a:font script="Viet" typeface="Arial"/>
+        <a:font script="Uigh" typeface="Microsoft Uighur"/>
+        <a:font script="Geor" typeface="Sylfaen"/>
+      </a:minorFont>
+    </a:fontScheme>
+    <a:fmtScheme name="Office">
+      <a:fillStyleLst>
+        <a:solidFill>
+          <a:schemeClr val="phClr"/>
+        </a:solidFill>
+        <a:gradFill rotWithShape="1">
+          <a:gsLst>
+            <a:gs pos="0">
+              <a:schemeClr val="phClr">
+                <a:lumMod val="110000"/>
+                <a:satMod val="105000"/>
+                <a:tint val="67000"/>
+              </a:schemeClr>
+            </a:gs>
+            <a:gs pos="50000">
+              <a:schemeClr val="phClr">
+                <a:lumMod val="105000"/>
+                <a:satMod val="103000"/>
+                <a:tint val="73000"/>
+              </a:schemeClr>
+            </a:gs>
+            <a:gs pos="100000">
+              <a:schemeClr val="phClr">
+                <a:lumMod val="105000"/>
+                <a:satMod val="109000"/>
+                <a:tint val="81000"/>
+              </a:schemeClr>
+            </a:gs>
+          </a:gsLst>
+          <a:lin ang="5400000" scaled="0"/>
+        </a:gradFill>
+        <a:gradFill rotWithShape="1">
+          <a:gsLst>
+            <a:gs pos="0">
+              <a:schemeClr val="phClr">
+                <a:satMod val="103000"/>
+                <a:lumMod val="102000"/>
+                <a:tint val="94000"/>
+              </a:schemeClr>
+            </a:gs>
+            <a:gs pos="50000">
+              <a:schemeClr val="phClr">
+                <a:satMod val="110000"/>
+                <a:lumMod val="100000"/>
+                <a:shade val="100000"/>
+              </a:schemeClr>
+            </a:gs>
+            <a:gs pos="100000">
+              <a:schemeClr val="phClr">
+                <a:lumMod val="99000"/>
+                <a:satMod val="120000"/>
+                <a:shade val="78000"/>
+              </a:schemeClr>
+            </a:gs>
+          </a:gsLst>
+          <a:lin ang="5400000" scaled="0"/>
+        </a:gradFill>
+      </a:fillStyleLst>
+      <a:lnStyleLst>
+        <a:ln w="6350" cap="flat" cmpd="sng" algn="ctr">
+          <a:solidFill>
+            <a:schemeClr val="phClr"/>
+          </a:solidFill>
+          <a:prstDash val="solid"/>
+          <a:miter lim="800000"/>
+        </a:ln>
+        <a:ln w="12700" cap="flat" cmpd="sng" algn="ctr">
+          <a:solidFill>
+            <a:schemeClr val="phClr"/>
+          </a:solidFill>
+          <a:prstDash val="solid"/>
+          <a:miter lim="800000"/>
+        </a:ln>
+        <a:ln w="19050" cap="flat" cmpd="sng" algn="ctr">
+          <a:solidFill>
+            <a:schemeClr val="phClr"/>
+          </a:solidFill>
+          <a:prstDash val="solid"/>
+          <a:miter lim="800000"/>
+        </a:ln>
+      </a:lnStyleLst>
+      <a:effectStyleLst>
+        <a:effectStyle>
+          <a:effectLst/>
+        </a:effectStyle>
+        <a:effectStyle>
+          <a:effectLst/>
+        </a:effectStyle>
+        <a:effectStyle>
+          <a:effectLst>
+            <a:outerShdw blurRad="57150" dist="19050" dir="5400000" algn="ctr" rotWithShape="0">
+              <a:srgbClr val="000000">
+                <a:alpha val="63000"/>
+              </a:srgbClr>
+            </a:outerShdw>
+          </a:effectLst>
+        </a:effectStyle>
+      </a:effectStyleLst>
+      <a:bgFillStyleLst>
+        <a:solidFill>
+          <a:schemeClr val="phClr"/>
+        </a:solidFill>
+        <a:solidFill>
+          <a:schemeClr val="phClr">
+            <a:tint val="95000"/>
+            <a:satMod val="170000"/>
+          </a:schemeClr>
+        </a:solidFill>
+        <a:gradFill rotWithShape="1">
+          <a:gsLst>
+            <a:gs pos="0">
+              <a:schemeClr val="phClr">
+                <a:tint val="93000"/>
+                <a:satMod val="150000"/>
+                <a:shade val="98000"/>
+                <a:lumMod val="102000"/>
+              </a:schemeClr>
+            </a:gs>
+            <a:gs pos="50000">
+              <a:schemeClr val="phClr">
+                <a:tint val="98000"/>
+                <a:satMod val="130000"/>
+                <a:shade val="90000"/>
+                <a:lumMod val="103000"/>
+              </a:schemeClr>
+            </a:gs>
+            <a:gs pos="100000">
+              <a:schemeClr val="phClr">
+                <a:shade val="63000"/>
+                <a:satMod val="120000"/>
+              </a:schemeClr>
+            </a:gs>
+          </a:gsLst>
+          <a:lin ang="5400000" scaled="0"/>
+        </a:gradFill>
+      </a:bgFillStyleLst>
+    </a:fmtScheme>
+  </a:themeElements>
+  <a:extLst>
+    <a:ext uri="{05A4C25C-085E-4340-85A3-A5531E510DB2}">
+      <thm15:themeFamily xmlns:thm15="http://schemas.microsoft.com/office/thememl/2012/main" name="Office Theme" id="{62F939B6-93AF-4DB8-9C6B-D6C7DFDC589F}" vid="{4A3C46E8-61CC-4603-A589-7422A47A8E4A}"/>
+    </a:ext>
+  </a:extLst>
+</a:theme>
 </file>
</xml_diff>